<commit_message>
tipovi pol poredaka upd
</commit_message>
<xml_diff>
--- a/data/prezentacije/politika/003_tipovi_politickih_poredaka.pptx
+++ b/data/prezentacije/politika/003_tipovi_politickih_poredaka.pptx
@@ -8,31 +8,31 @@
     <p:notesMasterId r:id="rId27"/>
   </p:notesMasterIdLst>
   <p:sldIdLst>
-    <p:sldId id="339" r:id="rId2"/>
-    <p:sldId id="340" r:id="rId3"/>
-    <p:sldId id="341" r:id="rId4"/>
-    <p:sldId id="342" r:id="rId5"/>
-    <p:sldId id="343" r:id="rId6"/>
-    <p:sldId id="346" r:id="rId7"/>
-    <p:sldId id="347" r:id="rId8"/>
-    <p:sldId id="348" r:id="rId9"/>
-    <p:sldId id="316" r:id="rId10"/>
-    <p:sldId id="319" r:id="rId11"/>
-    <p:sldId id="351" r:id="rId12"/>
-    <p:sldId id="317" r:id="rId13"/>
-    <p:sldId id="320" r:id="rId14"/>
-    <p:sldId id="349" r:id="rId15"/>
-    <p:sldId id="335" r:id="rId16"/>
-    <p:sldId id="329" r:id="rId17"/>
-    <p:sldId id="330" r:id="rId18"/>
-    <p:sldId id="331" r:id="rId19"/>
-    <p:sldId id="332" r:id="rId20"/>
-    <p:sldId id="337" r:id="rId21"/>
-    <p:sldId id="333" r:id="rId22"/>
-    <p:sldId id="336" r:id="rId23"/>
-    <p:sldId id="328" r:id="rId24"/>
-    <p:sldId id="338" r:id="rId25"/>
-    <p:sldId id="352" r:id="rId26"/>
+    <p:sldId id="353" r:id="rId2"/>
+    <p:sldId id="354" r:id="rId3"/>
+    <p:sldId id="355" r:id="rId4"/>
+    <p:sldId id="356" r:id="rId5"/>
+    <p:sldId id="357" r:id="rId6"/>
+    <p:sldId id="358" r:id="rId7"/>
+    <p:sldId id="359" r:id="rId8"/>
+    <p:sldId id="360" r:id="rId9"/>
+    <p:sldId id="361" r:id="rId10"/>
+    <p:sldId id="362" r:id="rId11"/>
+    <p:sldId id="363" r:id="rId12"/>
+    <p:sldId id="364" r:id="rId13"/>
+    <p:sldId id="365" r:id="rId14"/>
+    <p:sldId id="366" r:id="rId15"/>
+    <p:sldId id="367" r:id="rId16"/>
+    <p:sldId id="368" r:id="rId17"/>
+    <p:sldId id="369" r:id="rId18"/>
+    <p:sldId id="370" r:id="rId19"/>
+    <p:sldId id="371" r:id="rId20"/>
+    <p:sldId id="372" r:id="rId21"/>
+    <p:sldId id="373" r:id="rId22"/>
+    <p:sldId id="374" r:id="rId23"/>
+    <p:sldId id="375" r:id="rId24"/>
+    <p:sldId id="376" r:id="rId25"/>
+    <p:sldId id="377" r:id="rId26"/>
   </p:sldIdLst>
   <p:sldSz cx="9144000" cy="6858000" type="screen4x3"/>
   <p:notesSz cx="7772400" cy="10058400"/>
@@ -4306,6 +4306,11 @@
         </p:txBody>
       </p:sp>
     </p:spTree>
+    <p:extLst>
+      <p:ext uri="{BB962C8B-B14F-4D97-AF65-F5344CB8AC3E}">
+        <p14:creationId xmlns:p14="http://schemas.microsoft.com/office/powerpoint/2010/main" val="1275296855"/>
+      </p:ext>
+    </p:extLst>
   </p:cSld>
   <p:clrMapOvr>
     <a:masterClrMapping/>
@@ -6987,17 +6992,22 @@
         </p:spPr>
       </p:pic>
     </p:spTree>
+    <p:extLst>
+      <p:ext uri="{BB962C8B-B14F-4D97-AF65-F5344CB8AC3E}">
+        <p14:creationId xmlns:p14="http://schemas.microsoft.com/office/powerpoint/2010/main" val="3293365269"/>
+      </p:ext>
+    </p:extLst>
   </p:cSld>
   <p:clrMapOvr>
     <a:masterClrMapping/>
   </p:clrMapOvr>
-  <mc:AlternateContent xmlns:mc="http://schemas.openxmlformats.org/markup-compatibility/2006">
-    <mc:Choice xmlns:p14="http://schemas.microsoft.com/office/powerpoint/2010/main" Requires="p14">
+  <mc:AlternateContent xmlns:mc="http://schemas.openxmlformats.org/markup-compatibility/2006" xmlns:p14="http://schemas.microsoft.com/office/powerpoint/2010/main">
+    <mc:Choice Requires="p14">
       <p:transition>
         <p14:reveal/>
       </p:transition>
     </mc:Choice>
-    <mc:Fallback>
+    <mc:Fallback xmlns="">
       <p:transition>
         <p:fade/>
       </p:transition>
@@ -7100,30 +7110,9 @@
           <a:prstGeom prst="rect">
             <a:avLst/>
           </a:prstGeom>
-          <a:gradFill flip="none" rotWithShape="1">
-            <a:gsLst>
-              <a:gs pos="0">
-                <a:srgbClr val="C00000">
-                  <a:shade val="30000"/>
-                  <a:satMod val="115000"/>
-                </a:srgbClr>
-              </a:gs>
-              <a:gs pos="50000">
-                <a:srgbClr val="C00000">
-                  <a:shade val="67500"/>
-                  <a:satMod val="115000"/>
-                </a:srgbClr>
-              </a:gs>
-              <a:gs pos="100000">
-                <a:srgbClr val="C00000">
-                  <a:shade val="100000"/>
-                  <a:satMod val="115000"/>
-                </a:srgbClr>
-              </a:gs>
-            </a:gsLst>
-            <a:lin ang="16200000" scaled="1"/>
-            <a:tileRect/>
-          </a:gradFill>
+          <a:solidFill>
+            <a:srgbClr val="C00000"/>
+          </a:solidFill>
           <a:ln w="38100" cap="flat" cmpd="sng" algn="ctr">
             <a:solidFill>
               <a:schemeClr val="tx1"/>
@@ -7213,7 +7202,7 @@
               <a:defRPr/>
             </a:pPr>
             <a:r>
-              <a:rPr lang="pl-PL" sz="2100">
+              <a:rPr lang="pl-PL" sz="2100" dirty="0">
                 <a:latin typeface="Calibri" pitchFamily="34" charset="0"/>
                 <a:ea typeface="+mn-ea"/>
                 <a:cs typeface="Calibri" pitchFamily="34" charset="0"/>
@@ -7238,12 +7227,23 @@
               <a:defRPr/>
             </a:pPr>
             <a:r>
-              <a:rPr lang="pl-PL" sz="2100">
+              <a:rPr lang="pl-PL" sz="2100" dirty="0">
                 <a:latin typeface="Calibri" pitchFamily="34" charset="0"/>
                 <a:ea typeface="+mn-ea"/>
                 <a:cs typeface="Calibri" pitchFamily="34" charset="0"/>
               </a:rPr>
-              <a:t>zasnovan na ideologiji</a:t>
+              <a:t>zasnovan na </a:t>
+            </a:r>
+            <a:r>
+              <a:rPr lang="pl-PL" sz="2100" b="1" dirty="0">
+                <a:solidFill>
+                  <a:srgbClr val="FFC000"/>
+                </a:solidFill>
+                <a:latin typeface="Calibri" pitchFamily="34" charset="0"/>
+                <a:ea typeface="+mn-ea"/>
+                <a:cs typeface="Calibri" pitchFamily="34" charset="0"/>
+              </a:rPr>
+              <a:t>ideologiji</a:t>
             </a:r>
           </a:p>
           <a:p>
@@ -7263,7 +7263,7 @@
               <a:defRPr/>
             </a:pPr>
             <a:r>
-              <a:rPr lang="pl-PL" sz="2100">
+              <a:rPr lang="pl-PL" sz="2100" dirty="0">
                 <a:latin typeface="Calibri" pitchFamily="34" charset="0"/>
                 <a:ea typeface="+mn-ea"/>
                 <a:cs typeface="Calibri" pitchFamily="34" charset="0"/>
@@ -7288,7 +7288,7 @@
               <a:defRPr/>
             </a:pPr>
             <a:r>
-              <a:rPr lang="pl-PL" sz="2100">
+              <a:rPr lang="pl-PL" sz="2100" dirty="0">
                 <a:latin typeface="Calibri" pitchFamily="34" charset="0"/>
                 <a:ea typeface="+mn-ea"/>
                 <a:cs typeface="Calibri" pitchFamily="34" charset="0"/>
@@ -7313,7 +7313,7 @@
               <a:defRPr/>
             </a:pPr>
             <a:r>
-              <a:rPr lang="pl-PL" sz="2100" b="1">
+              <a:rPr lang="pl-PL" sz="2100" b="1" dirty="0">
                 <a:solidFill>
                   <a:srgbClr val="FFC000"/>
                 </a:solidFill>
@@ -7331,7 +7331,7 @@
               <a:t>država</a:t>
             </a:r>
             <a:r>
-              <a:rPr lang="pl-PL" sz="2100">
+              <a:rPr lang="pl-PL" sz="2100" dirty="0">
                 <a:latin typeface="Calibri" pitchFamily="34" charset="0"/>
                 <a:ea typeface="+mn-ea"/>
                 <a:cs typeface="Calibri" pitchFamily="34" charset="0"/>
@@ -7339,7 +7339,7 @@
               <a:t> </a:t>
             </a:r>
             <a:r>
-              <a:rPr lang="pl-PL" sz="2100" b="1">
+              <a:rPr lang="pl-PL" sz="2100" b="1" dirty="0">
                 <a:solidFill>
                   <a:srgbClr val="FFC000"/>
                 </a:solidFill>
@@ -7357,7 +7357,7 @@
               <a:t>ima kontrolu </a:t>
             </a:r>
             <a:r>
-              <a:rPr lang="pl-PL" sz="2100">
+              <a:rPr lang="pl-PL" sz="2100" dirty="0">
                 <a:latin typeface="Calibri" pitchFamily="34" charset="0"/>
                 <a:ea typeface="+mn-ea"/>
                 <a:cs typeface="Calibri" pitchFamily="34" charset="0"/>
@@ -7382,7 +7382,7 @@
               <a:defRPr/>
             </a:pPr>
             <a:r>
-              <a:rPr lang="pl-PL" sz="2100">
+              <a:rPr lang="pl-PL" sz="2100" dirty="0">
                 <a:latin typeface="Calibri" pitchFamily="34" charset="0"/>
                 <a:ea typeface="+mn-ea"/>
                 <a:cs typeface="Calibri" pitchFamily="34" charset="0"/>
@@ -7407,7 +7407,7 @@
               <a:defRPr/>
             </a:pPr>
             <a:r>
-              <a:rPr lang="pl-PL" sz="2100">
+              <a:rPr lang="pl-PL" sz="2100" dirty="0">
                 <a:latin typeface="Calibri" pitchFamily="34" charset="0"/>
                 <a:ea typeface="+mn-ea"/>
                 <a:cs typeface="Calibri" pitchFamily="34" charset="0"/>
@@ -7541,7 +7541,18 @@
                 <a:ea typeface="+mn-ea"/>
                 <a:cs typeface="Calibri" pitchFamily="34" charset="0"/>
               </a:rPr>
-              <a:t>nema ideologije</a:t>
+              <a:t>nema </a:t>
+            </a:r>
+            <a:r>
+              <a:rPr lang="pl-PL" sz="2100" b="1" dirty="0">
+                <a:solidFill>
+                  <a:srgbClr val="FFC000"/>
+                </a:solidFill>
+                <a:latin typeface="Calibri" pitchFamily="34" charset="0"/>
+                <a:ea typeface="+mn-ea"/>
+                <a:cs typeface="Calibri" pitchFamily="34" charset="0"/>
+              </a:rPr>
+              <a:t>ideologije</a:t>
             </a:r>
           </a:p>
           <a:p>
@@ -7737,33 +7748,9 @@
           <a:prstGeom prst="rect">
             <a:avLst/>
           </a:prstGeom>
-          <a:gradFill flip="none" rotWithShape="1">
-            <a:gsLst>
-              <a:gs pos="0">
-                <a:schemeClr val="accent4">
-                  <a:lumMod val="50000"/>
-                  <a:shade val="30000"/>
-                  <a:satMod val="115000"/>
-                </a:schemeClr>
-              </a:gs>
-              <a:gs pos="50000">
-                <a:schemeClr val="accent4">
-                  <a:lumMod val="50000"/>
-                  <a:shade val="67500"/>
-                  <a:satMod val="115000"/>
-                </a:schemeClr>
-              </a:gs>
-              <a:gs pos="100000">
-                <a:schemeClr val="accent4">
-                  <a:lumMod val="50000"/>
-                  <a:shade val="100000"/>
-                  <a:satMod val="115000"/>
-                </a:schemeClr>
-              </a:gs>
-            </a:gsLst>
-            <a:lin ang="16200000" scaled="1"/>
-            <a:tileRect/>
-          </a:gradFill>
+          <a:solidFill>
+            <a:srgbClr val="002060"/>
+          </a:solidFill>
           <a:ln w="38100" cap="flat" cmpd="sng" algn="ctr">
             <a:solidFill>
               <a:schemeClr val="tx1"/>
@@ -8154,17 +8141,22 @@
         </p:txBody>
       </p:sp>
     </p:spTree>
+    <p:extLst>
+      <p:ext uri="{BB962C8B-B14F-4D97-AF65-F5344CB8AC3E}">
+        <p14:creationId xmlns:p14="http://schemas.microsoft.com/office/powerpoint/2010/main" val="3530078748"/>
+      </p:ext>
+    </p:extLst>
   </p:cSld>
   <p:clrMapOvr>
     <a:masterClrMapping/>
   </p:clrMapOvr>
-  <mc:AlternateContent xmlns:mc="http://schemas.openxmlformats.org/markup-compatibility/2006">
-    <mc:Choice xmlns:p14="http://schemas.microsoft.com/office/powerpoint/2010/main" Requires="p14">
+  <mc:AlternateContent xmlns:mc="http://schemas.openxmlformats.org/markup-compatibility/2006" xmlns:p14="http://schemas.microsoft.com/office/powerpoint/2010/main">
+    <mc:Choice Requires="p14">
       <p:transition>
         <p14:reveal/>
       </p:transition>
     </mc:Choice>
-    <mc:Fallback>
+    <mc:Fallback xmlns="">
       <p:transition>
         <p:fade/>
       </p:transition>
@@ -9617,30 +9609,11 @@
           <a:prstGeom prst="rect">
             <a:avLst/>
           </a:prstGeom>
-          <a:gradFill flip="none" rotWithShape="1">
-            <a:gsLst>
-              <a:gs pos="0">
-                <a:srgbClr val="7030A0">
-                  <a:shade val="30000"/>
-                  <a:satMod val="115000"/>
-                </a:srgbClr>
-              </a:gs>
-              <a:gs pos="50000">
-                <a:srgbClr val="7030A0">
-                  <a:shade val="67500"/>
-                  <a:satMod val="115000"/>
-                </a:srgbClr>
-              </a:gs>
-              <a:gs pos="100000">
-                <a:srgbClr val="7030A0">
-                  <a:shade val="100000"/>
-                  <a:satMod val="115000"/>
-                </a:srgbClr>
-              </a:gs>
-            </a:gsLst>
-            <a:lin ang="16200000" scaled="1"/>
-            <a:tileRect/>
-          </a:gradFill>
+          <a:solidFill>
+            <a:schemeClr val="accent6">
+              <a:lumMod val="50000"/>
+            </a:schemeClr>
+          </a:solidFill>
           <a:ln w="38100">
             <a:solidFill>
               <a:schemeClr val="tx1"/>
@@ -9709,30 +9682,9 @@
           <a:prstGeom prst="rect">
             <a:avLst/>
           </a:prstGeom>
-          <a:gradFill flip="none" rotWithShape="1">
-            <a:gsLst>
-              <a:gs pos="0">
-                <a:srgbClr val="C00000">
-                  <a:shade val="30000"/>
-                  <a:satMod val="115000"/>
-                </a:srgbClr>
-              </a:gs>
-              <a:gs pos="50000">
-                <a:srgbClr val="C00000">
-                  <a:shade val="67500"/>
-                  <a:satMod val="115000"/>
-                </a:srgbClr>
-              </a:gs>
-              <a:gs pos="100000">
-                <a:srgbClr val="C00000">
-                  <a:shade val="100000"/>
-                  <a:satMod val="115000"/>
-                </a:srgbClr>
-              </a:gs>
-            </a:gsLst>
-            <a:lin ang="16200000" scaled="1"/>
-            <a:tileRect/>
-          </a:gradFill>
+          <a:solidFill>
+            <a:srgbClr val="C00000"/>
+          </a:solidFill>
           <a:ln w="38100">
             <a:solidFill>
               <a:schemeClr val="tx1"/>
@@ -9801,33 +9753,9 @@
           <a:prstGeom prst="rect">
             <a:avLst/>
           </a:prstGeom>
-          <a:gradFill flip="none" rotWithShape="1">
-            <a:gsLst>
-              <a:gs pos="0">
-                <a:schemeClr val="accent1">
-                  <a:lumMod val="75000"/>
-                  <a:shade val="30000"/>
-                  <a:satMod val="115000"/>
-                </a:schemeClr>
-              </a:gs>
-              <a:gs pos="50000">
-                <a:schemeClr val="accent1">
-                  <a:lumMod val="75000"/>
-                  <a:shade val="67500"/>
-                  <a:satMod val="115000"/>
-                </a:schemeClr>
-              </a:gs>
-              <a:gs pos="100000">
-                <a:schemeClr val="accent1">
-                  <a:lumMod val="75000"/>
-                  <a:shade val="100000"/>
-                  <a:satMod val="115000"/>
-                </a:schemeClr>
-              </a:gs>
-            </a:gsLst>
-            <a:lin ang="16200000" scaled="1"/>
-            <a:tileRect/>
-          </a:gradFill>
+          <a:solidFill>
+            <a:srgbClr val="008000"/>
+          </a:solidFill>
           <a:ln w="38100">
             <a:solidFill>
               <a:schemeClr val="tx1"/>
@@ -9896,33 +9824,11 @@
           <a:prstGeom prst="rect">
             <a:avLst/>
           </a:prstGeom>
-          <a:gradFill flip="none" rotWithShape="1">
-            <a:gsLst>
-              <a:gs pos="0">
-                <a:schemeClr val="accent4">
-                  <a:lumMod val="50000"/>
-                  <a:shade val="30000"/>
-                  <a:satMod val="115000"/>
-                </a:schemeClr>
-              </a:gs>
-              <a:gs pos="50000">
-                <a:schemeClr val="accent4">
-                  <a:lumMod val="50000"/>
-                  <a:shade val="67500"/>
-                  <a:satMod val="115000"/>
-                </a:schemeClr>
-              </a:gs>
-              <a:gs pos="100000">
-                <a:schemeClr val="accent4">
-                  <a:lumMod val="50000"/>
-                  <a:shade val="100000"/>
-                  <a:satMod val="115000"/>
-                </a:schemeClr>
-              </a:gs>
-            </a:gsLst>
-            <a:lin ang="16200000" scaled="1"/>
-            <a:tileRect/>
-          </a:gradFill>
+          <a:solidFill>
+            <a:schemeClr val="accent4">
+              <a:lumMod val="75000"/>
+            </a:schemeClr>
+          </a:solidFill>
           <a:ln w="38100">
             <a:solidFill>
               <a:schemeClr val="tx1"/>
@@ -9998,36 +9904,11 @@
           <a:prstGeom prst="rect">
             <a:avLst/>
           </a:prstGeom>
-          <a:gradFill flip="none" rotWithShape="1">
-            <a:gsLst>
-              <a:gs pos="0">
-                <a:schemeClr val="bg1">
-                  <a:lumMod val="65000"/>
-                  <a:lumOff val="35000"/>
-                  <a:shade val="30000"/>
-                  <a:satMod val="115000"/>
-                </a:schemeClr>
-              </a:gs>
-              <a:gs pos="50000">
-                <a:schemeClr val="bg1">
-                  <a:lumMod val="65000"/>
-                  <a:lumOff val="35000"/>
-                  <a:shade val="67500"/>
-                  <a:satMod val="115000"/>
-                </a:schemeClr>
-              </a:gs>
-              <a:gs pos="100000">
-                <a:schemeClr val="bg1">
-                  <a:lumMod val="65000"/>
-                  <a:lumOff val="35000"/>
-                  <a:shade val="100000"/>
-                  <a:satMod val="115000"/>
-                </a:schemeClr>
-              </a:gs>
-            </a:gsLst>
-            <a:lin ang="16200000" scaled="1"/>
-            <a:tileRect/>
-          </a:gradFill>
+          <a:solidFill>
+            <a:schemeClr val="bg2">
+              <a:lumMod val="75000"/>
+            </a:schemeClr>
+          </a:solidFill>
           <a:ln w="38100">
             <a:solidFill>
               <a:schemeClr val="tx1"/>
@@ -10090,8 +9971,8 @@
         </p:nvSpPr>
         <p:spPr>
           <a:xfrm>
-            <a:off x="2143108" y="5566492"/>
-            <a:ext cx="7000892" cy="1015663"/>
+            <a:off x="2143108" y="5578367"/>
+            <a:ext cx="7000892" cy="951030"/>
           </a:xfrm>
           <a:prstGeom prst="rect">
             <a:avLst/>
@@ -10199,6 +10080,9 @@
               <a:spcBef>
                 <a:spcPts val="0"/>
               </a:spcBef>
+              <a:buClr>
+                <a:schemeClr val="tx1"/>
+              </a:buClr>
               <a:buFont typeface="Calibri" pitchFamily="34" charset="0"/>
               <a:buChar char="─"/>
             </a:pPr>
@@ -10220,8 +10104,8 @@
         </p:nvSpPr>
         <p:spPr>
           <a:xfrm>
-            <a:off x="2143108" y="1556081"/>
-            <a:ext cx="6840000" cy="1015663"/>
+            <a:off x="2143108" y="1579831"/>
+            <a:ext cx="6840000" cy="951030"/>
           </a:xfrm>
           <a:prstGeom prst="rect">
             <a:avLst/>
@@ -10238,6 +10122,9 @@
               <a:spcBef>
                 <a:spcPts val="0"/>
               </a:spcBef>
+              <a:buClr>
+                <a:schemeClr val="tx1"/>
+              </a:buClr>
               <a:buFont typeface="Calibri" pitchFamily="34" charset="0"/>
               <a:buChar char="─"/>
             </a:pPr>
@@ -10278,6 +10165,9 @@
               <a:spcBef>
                 <a:spcPts val="0"/>
               </a:spcBef>
+              <a:buClr>
+                <a:schemeClr val="tx1"/>
+              </a:buClr>
               <a:buFont typeface="Calibri" pitchFamily="34" charset="0"/>
               <a:buChar char="─"/>
             </a:pPr>
@@ -10301,6 +10191,9 @@
               <a:spcBef>
                 <a:spcPts val="0"/>
               </a:spcBef>
+              <a:buClr>
+                <a:schemeClr val="tx1"/>
+              </a:buClr>
               <a:buFont typeface="Calibri" pitchFamily="34" charset="0"/>
               <a:buChar char="─"/>
             </a:pPr>
@@ -10364,7 +10257,7 @@
         <p:spPr>
           <a:xfrm>
             <a:off x="2143108" y="2913403"/>
-            <a:ext cx="6840000" cy="1015663"/>
+            <a:ext cx="6840000" cy="951030"/>
           </a:xfrm>
           <a:prstGeom prst="rect">
             <a:avLst/>
@@ -10381,6 +10274,9 @@
               <a:spcBef>
                 <a:spcPts val="0"/>
               </a:spcBef>
+              <a:buClr>
+                <a:schemeClr val="tx1"/>
+              </a:buClr>
               <a:buFont typeface="Calibri" pitchFamily="34" charset="0"/>
               <a:buChar char="─"/>
             </a:pPr>
@@ -10421,6 +10317,9 @@
               <a:spcBef>
                 <a:spcPts val="0"/>
               </a:spcBef>
+              <a:buClr>
+                <a:schemeClr val="tx1"/>
+              </a:buClr>
               <a:buFont typeface="Calibri" pitchFamily="34" charset="0"/>
               <a:buChar char="─"/>
             </a:pPr>
@@ -10444,6 +10343,9 @@
               <a:spcBef>
                 <a:spcPts val="0"/>
               </a:spcBef>
+              <a:buClr>
+                <a:schemeClr val="tx1"/>
+              </a:buClr>
               <a:buFont typeface="Calibri" pitchFamily="34" charset="0"/>
               <a:buChar char="─"/>
             </a:pPr>
@@ -10506,8 +10408,8 @@
         </p:nvSpPr>
         <p:spPr>
           <a:xfrm>
-            <a:off x="2143108" y="4214818"/>
-            <a:ext cx="6840000" cy="1015663"/>
+            <a:off x="2143108" y="4238568"/>
+            <a:ext cx="6840000" cy="951030"/>
           </a:xfrm>
           <a:prstGeom prst="rect">
             <a:avLst/>
@@ -10524,6 +10426,9 @@
               <a:spcBef>
                 <a:spcPts val="0"/>
               </a:spcBef>
+              <a:buClr>
+                <a:schemeClr val="tx1"/>
+              </a:buClr>
               <a:buFont typeface="Calibri" pitchFamily="34" charset="0"/>
               <a:buChar char="─"/>
             </a:pPr>
@@ -10557,6 +10462,9 @@
               <a:spcBef>
                 <a:spcPts val="0"/>
               </a:spcBef>
+              <a:buClr>
+                <a:schemeClr val="tx1"/>
+              </a:buClr>
               <a:buFont typeface="Calibri" pitchFamily="34" charset="0"/>
               <a:buChar char="─"/>
             </a:pPr>
@@ -10587,6 +10495,9 @@
               <a:spcBef>
                 <a:spcPts val="0"/>
               </a:spcBef>
+              <a:buClr>
+                <a:schemeClr val="tx1"/>
+              </a:buClr>
               <a:buFont typeface="Calibri" pitchFamily="34" charset="0"/>
               <a:buChar char="─"/>
             </a:pPr>
@@ -10691,8 +10602,8 @@
         </p:nvSpPr>
         <p:spPr>
           <a:xfrm>
-            <a:off x="2161156" y="198759"/>
-            <a:ext cx="6840000" cy="1015663"/>
+            <a:off x="2161156" y="231075"/>
+            <a:ext cx="6840000" cy="951030"/>
           </a:xfrm>
           <a:prstGeom prst="rect">
             <a:avLst/>
@@ -10709,6 +10620,9 @@
               <a:spcBef>
                 <a:spcPts val="0"/>
               </a:spcBef>
+              <a:buClr>
+                <a:schemeClr val="tx1"/>
+              </a:buClr>
               <a:buFont typeface="Calibri" pitchFamily="34" charset="0"/>
               <a:buChar char="─"/>
             </a:pPr>
@@ -10742,6 +10656,9 @@
               <a:spcBef>
                 <a:spcPts val="0"/>
               </a:spcBef>
+              <a:buClr>
+                <a:schemeClr val="tx1"/>
+              </a:buClr>
               <a:buFont typeface="Calibri" pitchFamily="34" charset="0"/>
               <a:buChar char="─"/>
             </a:pPr>
@@ -10765,6 +10682,9 @@
               <a:spcBef>
                 <a:spcPts val="0"/>
               </a:spcBef>
+              <a:buClr>
+                <a:schemeClr val="tx1"/>
+              </a:buClr>
               <a:buFont typeface="Calibri" pitchFamily="34" charset="0"/>
               <a:buChar char="─"/>
             </a:pPr>
@@ -11074,17 +10994,22 @@
         </p:txBody>
       </p:sp>
     </p:spTree>
+    <p:extLst>
+      <p:ext uri="{BB962C8B-B14F-4D97-AF65-F5344CB8AC3E}">
+        <p14:creationId xmlns:p14="http://schemas.microsoft.com/office/powerpoint/2010/main" val="3024469596"/>
+      </p:ext>
+    </p:extLst>
   </p:cSld>
   <p:clrMapOvr>
     <a:masterClrMapping/>
   </p:clrMapOvr>
-  <mc:AlternateContent xmlns:mc="http://schemas.openxmlformats.org/markup-compatibility/2006">
-    <mc:Choice xmlns:p14="http://schemas.microsoft.com/office/powerpoint/2010/main" Requires="p14">
+  <mc:AlternateContent xmlns:mc="http://schemas.openxmlformats.org/markup-compatibility/2006" xmlns:p14="http://schemas.microsoft.com/office/powerpoint/2010/main">
+    <mc:Choice Requires="p14">
       <p:transition>
         <p14:reveal/>
       </p:transition>
     </mc:Choice>
-    <mc:Fallback>
+    <mc:Fallback xmlns="">
       <p:transition>
         <p:fade/>
       </p:transition>
@@ -11982,11 +11907,11 @@
       </p:par>
     </p:tnLst>
     <p:bldLst>
-      <p:bldP spid="3" grpId="0" uiExpand="1" build="allAtOnce" animBg="1"/>
-      <p:bldP spid="4" grpId="0" uiExpand="1" build="allAtOnce" animBg="1"/>
-      <p:bldP spid="5" grpId="0" uiExpand="1" build="allAtOnce" animBg="1"/>
-      <p:bldP spid="6" grpId="0" uiExpand="1" build="allAtOnce" animBg="1"/>
-      <p:bldP spid="12" grpId="0" uiExpand="1" build="allAtOnce" animBg="1"/>
+      <p:bldP spid="3" grpId="0" build="allAtOnce" animBg="1"/>
+      <p:bldP spid="4" grpId="0" build="allAtOnce" animBg="1"/>
+      <p:bldP spid="5" grpId="0" build="allAtOnce" animBg="1"/>
+      <p:bldP spid="6" grpId="0" build="allAtOnce" animBg="1"/>
+      <p:bldP spid="12" grpId="0" build="allAtOnce" animBg="1"/>
       <p:bldP spid="13" grpId="0"/>
       <p:bldP spid="15" grpId="0"/>
       <p:bldP spid="16" grpId="0"/>
@@ -12029,8 +11954,8 @@
         </p:nvSpPr>
         <p:spPr bwMode="auto">
           <a:xfrm>
-            <a:off x="142875" y="857250"/>
-            <a:ext cx="8786813" cy="5786438"/>
+            <a:off x="142875" y="810914"/>
+            <a:ext cx="8893621" cy="5786438"/>
           </a:xfrm>
           <a:prstGeom prst="rect">
             <a:avLst/>
@@ -12049,6 +11974,9 @@
           <a:lstStyle/>
           <a:p>
             <a:pPr marL="457200" indent="-457200" hangingPunct="0">
+              <a:lnSpc>
+                <a:spcPct val="100000"/>
+              </a:lnSpc>
               <a:spcBef>
                 <a:spcPts val="0"/>
               </a:spcBef>
@@ -12075,7 +12003,7 @@
               <a:defRPr/>
             </a:pPr>
             <a:r>
-              <a:rPr lang="hr-HR" sz="2400" b="1">
+              <a:rPr lang="hr-HR" sz="3600" b="1" dirty="0">
                 <a:solidFill>
                   <a:srgbClr val="FFC000"/>
                 </a:solidFill>
@@ -12086,22 +12014,14 @@
                     </a:srgbClr>
                   </a:outerShdw>
                 </a:effectLst>
-                <a:latin typeface="Calibri" pitchFamily="34" charset="0"/>
+                <a:latin typeface="Calibri" panose="020F0502020204030204" pitchFamily="34" charset="0"/>
                 <a:ea typeface="WenQuanYi Micro Hei" charset="0"/>
                 <a:cs typeface="Calibri" pitchFamily="34" charset="0"/>
               </a:rPr>
-              <a:t>AUTORITARIZAM </a:t>
-            </a:r>
-            <a:r>
-              <a:rPr lang="hr-HR" sz="2400">
-                <a:latin typeface="Calibri" pitchFamily="34" charset="0"/>
-                <a:ea typeface="WenQuanYi Micro Hei" charset="0"/>
-                <a:cs typeface="Calibri" pitchFamily="34" charset="0"/>
-              </a:rPr>
-              <a:t>– sustav vladavine u kojem se vlast obnaša s </a:t>
-            </a:r>
-            <a:r>
-              <a:rPr lang="hr-HR" sz="2400" b="1">
+              <a:t>AUTORITARIZAM</a:t>
+            </a:r>
+            <a:r>
+              <a:rPr lang="hr-HR" sz="2800" b="1" dirty="0">
                 <a:solidFill>
                   <a:srgbClr val="FFC000"/>
                 </a:solidFill>
@@ -12112,6 +12032,32 @@
                     </a:srgbClr>
                   </a:outerShdw>
                 </a:effectLst>
+                <a:latin typeface="Calibri" panose="020F0502020204030204" pitchFamily="34" charset="0"/>
+                <a:ea typeface="WenQuanYi Micro Hei" charset="0"/>
+                <a:cs typeface="Calibri" pitchFamily="34" charset="0"/>
+              </a:rPr>
+              <a:t> </a:t>
+            </a:r>
+            <a:r>
+              <a:rPr lang="hr-HR" sz="2800" dirty="0">
+                <a:latin typeface="Calibri" pitchFamily="34" charset="0"/>
+                <a:ea typeface="WenQuanYi Micro Hei" charset="0"/>
+                <a:cs typeface="Calibri" pitchFamily="34" charset="0"/>
+              </a:rPr>
+              <a:t>– sustav vladavine u kojem se vlast obnaša s </a:t>
+            </a:r>
+            <a:r>
+              <a:rPr lang="hr-HR" sz="2800" b="1" dirty="0">
+                <a:solidFill>
+                  <a:srgbClr val="FFC000"/>
+                </a:solidFill>
+                <a:effectLst>
+                  <a:outerShdw blurRad="38100" dist="38100" dir="2700000" algn="tl">
+                    <a:srgbClr val="000000">
+                      <a:alpha val="43137"/>
+                    </a:srgbClr>
+                  </a:outerShdw>
+                </a:effectLst>
                 <a:latin typeface="Calibri" pitchFamily="34" charset="0"/>
                 <a:ea typeface="WenQuanYi Micro Hei" charset="0"/>
                 <a:cs typeface="Calibri" pitchFamily="34" charset="0"/>
@@ -12121,42 +12067,9 @@
           </a:p>
           <a:p>
             <a:pPr marL="457200" indent="-457200" hangingPunct="0">
-              <a:spcBef>
-                <a:spcPts val="0"/>
-              </a:spcBef>
-              <a:buClr>
-                <a:schemeClr val="tx1"/>
-              </a:buClr>
-              <a:buSzPct val="100000"/>
-              <a:buFont typeface="Arial" pitchFamily="34" charset="0"/>
-              <a:buChar char="–"/>
-              <a:tabLst>
-                <a:tab pos="723900" algn="l"/>
-                <a:tab pos="1447800" algn="l"/>
-                <a:tab pos="2171700" algn="l"/>
-                <a:tab pos="2895600" algn="l"/>
-                <a:tab pos="3619500" algn="l"/>
-                <a:tab pos="4343400" algn="l"/>
-                <a:tab pos="5067300" algn="l"/>
-                <a:tab pos="5791200" algn="l"/>
-                <a:tab pos="6515100" algn="l"/>
-                <a:tab pos="7239000" algn="l"/>
-                <a:tab pos="7962900" algn="l"/>
-                <a:tab pos="8686800" algn="l"/>
-              </a:tabLst>
-              <a:defRPr/>
-            </a:pPr>
-            <a:r>
-              <a:rPr lang="hr-HR" sz="2400" i="1">
-                <a:latin typeface="Calibri" pitchFamily="34" charset="0"/>
-                <a:ea typeface="WenQuanYi Micro Hei" charset="0"/>
-                <a:cs typeface="Calibri" pitchFamily="34" charset="0"/>
-              </a:rPr>
-              <a:t>vlast obnaša jedna obitelj, mala skupina ljudi ili snažna politička stranka (prisutno višestranačje)</a:t>
-            </a:r>
-          </a:p>
-          <a:p>
-            <a:pPr marL="457200" indent="-457200" hangingPunct="0">
+              <a:lnSpc>
+                <a:spcPct val="100000"/>
+              </a:lnSpc>
               <a:spcBef>
                 <a:spcPts val="1200"/>
               </a:spcBef>
@@ -12183,192 +12096,19 @@
               <a:defRPr/>
             </a:pPr>
             <a:r>
-              <a:rPr lang="hr-HR" sz="2400" b="1">
-                <a:solidFill>
-                  <a:srgbClr val="FFC000"/>
-                </a:solidFill>
-                <a:effectLst>
-                  <a:outerShdw blurRad="38100" dist="38100" dir="2700000" algn="tl">
-                    <a:srgbClr val="000000">
-                      <a:alpha val="43137"/>
-                    </a:srgbClr>
-                  </a:outerShdw>
-                </a:effectLst>
+              <a:rPr lang="hr-HR" sz="2400" i="1" dirty="0">
                 <a:latin typeface="Calibri" pitchFamily="34" charset="0"/>
                 <a:ea typeface="WenQuanYi Micro Hei" charset="0"/>
                 <a:cs typeface="Calibri" pitchFamily="34" charset="0"/>
               </a:rPr>
-              <a:t>karakteristike autoritarizma</a:t>
-            </a:r>
-          </a:p>
-          <a:p>
-            <a:pPr marL="1200150" lvl="1" indent="-457200" hangingPunct="0">
-              <a:spcBef>
-                <a:spcPts val="0"/>
-              </a:spcBef>
-              <a:buClr>
-                <a:schemeClr val="tx1"/>
-              </a:buClr>
-              <a:buSzPct val="100000"/>
-              <a:buFont typeface="Arial" pitchFamily="34" charset="0"/>
-              <a:buChar char="–"/>
-              <a:tabLst>
-                <a:tab pos="723900" algn="l"/>
-                <a:tab pos="1447800" algn="l"/>
-                <a:tab pos="2171700" algn="l"/>
-                <a:tab pos="2895600" algn="l"/>
-                <a:tab pos="3619500" algn="l"/>
-                <a:tab pos="4343400" algn="l"/>
-                <a:tab pos="5067300" algn="l"/>
-                <a:tab pos="5791200" algn="l"/>
-                <a:tab pos="6515100" algn="l"/>
-                <a:tab pos="7239000" algn="l"/>
-                <a:tab pos="7962900" algn="l"/>
-                <a:tab pos="8686800" algn="l"/>
-              </a:tabLst>
-              <a:defRPr/>
-            </a:pPr>
-            <a:r>
-              <a:rPr lang="hr-HR" sz="2400">
-                <a:latin typeface="Calibri" pitchFamily="34" charset="0"/>
-                <a:ea typeface="WenQuanYi Micro Hei" charset="0"/>
-                <a:cs typeface="Calibri" pitchFamily="34" charset="0"/>
-              </a:rPr>
-              <a:t>značajna uloga vojske</a:t>
-            </a:r>
-          </a:p>
-          <a:p>
-            <a:pPr marL="1200150" lvl="1" indent="-457200" hangingPunct="0">
-              <a:spcBef>
-                <a:spcPts val="0"/>
-              </a:spcBef>
-              <a:buClr>
-                <a:schemeClr val="tx1"/>
-              </a:buClr>
-              <a:buSzPct val="100000"/>
-              <a:buFont typeface="Arial" pitchFamily="34" charset="0"/>
-              <a:buChar char="–"/>
-              <a:tabLst>
-                <a:tab pos="723900" algn="l"/>
-                <a:tab pos="1447800" algn="l"/>
-                <a:tab pos="2171700" algn="l"/>
-                <a:tab pos="2895600" algn="l"/>
-                <a:tab pos="3619500" algn="l"/>
-                <a:tab pos="4343400" algn="l"/>
-                <a:tab pos="5067300" algn="l"/>
-                <a:tab pos="5791200" algn="l"/>
-                <a:tab pos="6515100" algn="l"/>
-                <a:tab pos="7239000" algn="l"/>
-                <a:tab pos="7962900" algn="l"/>
-                <a:tab pos="8686800" algn="l"/>
-              </a:tabLst>
-              <a:defRPr/>
-            </a:pPr>
-            <a:r>
-              <a:rPr lang="hr-HR" sz="2400">
-                <a:latin typeface="Calibri" pitchFamily="34" charset="0"/>
-                <a:ea typeface="WenQuanYi Micro Hei" charset="0"/>
-                <a:cs typeface="Calibri" pitchFamily="34" charset="0"/>
-              </a:rPr>
-              <a:t>ne nastoji nadzirati sve vidove dr. života</a:t>
-            </a:r>
-          </a:p>
-          <a:p>
-            <a:pPr marL="1200150" lvl="1" indent="-457200" hangingPunct="0">
-              <a:spcBef>
-                <a:spcPts val="0"/>
-              </a:spcBef>
-              <a:buClr>
-                <a:schemeClr val="tx1"/>
-              </a:buClr>
-              <a:buSzPct val="100000"/>
-              <a:buFont typeface="Arial" pitchFamily="34" charset="0"/>
-              <a:buChar char="–"/>
-              <a:tabLst>
-                <a:tab pos="723900" algn="l"/>
-                <a:tab pos="1447800" algn="l"/>
-                <a:tab pos="2171700" algn="l"/>
-                <a:tab pos="2895600" algn="l"/>
-                <a:tab pos="3619500" algn="l"/>
-                <a:tab pos="4343400" algn="l"/>
-                <a:tab pos="5067300" algn="l"/>
-                <a:tab pos="5791200" algn="l"/>
-                <a:tab pos="6515100" algn="l"/>
-                <a:tab pos="7239000" algn="l"/>
-                <a:tab pos="7962900" algn="l"/>
-                <a:tab pos="8686800" algn="l"/>
-              </a:tabLst>
-              <a:defRPr/>
-            </a:pPr>
-            <a:r>
-              <a:rPr lang="hr-HR" sz="2400">
-                <a:latin typeface="Calibri" pitchFamily="34" charset="0"/>
-                <a:ea typeface="WenQuanYi Micro Hei" charset="0"/>
-                <a:cs typeface="Calibri" pitchFamily="34" charset="0"/>
-              </a:rPr>
-              <a:t>ekonomska, religijska, kulturna i obiteljska pitanja </a:t>
-            </a:r>
-            <a:r>
-              <a:rPr lang="hr-HR" sz="2400">
-                <a:solidFill>
-                  <a:srgbClr val="FFFFFF"/>
-                </a:solidFill>
-                <a:latin typeface="Calibri" pitchFamily="34" charset="0"/>
-                <a:ea typeface="WenQuanYi Micro Hei" charset="0"/>
-                <a:cs typeface="Calibri" pitchFamily="34" charset="0"/>
-              </a:rPr>
-              <a:t>prepuštena su individualnom odlučivanju</a:t>
-            </a:r>
-            <a:endParaRPr lang="hr-HR" sz="5400">
-              <a:solidFill>
-                <a:srgbClr val="FFFFFF"/>
-              </a:solidFill>
-              <a:latin typeface="Calibri" pitchFamily="34" charset="0"/>
-              <a:ea typeface="WenQuanYi Micro Hei" charset="0"/>
-              <a:cs typeface="Calibri" pitchFamily="34" charset="0"/>
-            </a:endParaRPr>
-          </a:p>
-          <a:p>
-            <a:pPr marL="1200150" lvl="1" indent="-457200" hangingPunct="0">
-              <a:spcBef>
-                <a:spcPts val="0"/>
-              </a:spcBef>
-              <a:buClr>
-                <a:schemeClr val="tx1"/>
-              </a:buClr>
-              <a:buSzPct val="100000"/>
-              <a:buFont typeface="Arial" pitchFamily="34" charset="0"/>
-              <a:buChar char="–"/>
-              <a:tabLst>
-                <a:tab pos="723900" algn="l"/>
-                <a:tab pos="1447800" algn="l"/>
-                <a:tab pos="2171700" algn="l"/>
-                <a:tab pos="2895600" algn="l"/>
-                <a:tab pos="3619500" algn="l"/>
-                <a:tab pos="4343400" algn="l"/>
-                <a:tab pos="5067300" algn="l"/>
-                <a:tab pos="5791200" algn="l"/>
-                <a:tab pos="6515100" algn="l"/>
-                <a:tab pos="7239000" algn="l"/>
-                <a:tab pos="7962900" algn="l"/>
-                <a:tab pos="8686800" algn="l"/>
-              </a:tabLst>
-              <a:defRPr/>
-            </a:pPr>
-            <a:r>
-              <a:rPr lang="hr-HR" sz="2400">
-                <a:solidFill>
-                  <a:srgbClr val="FFFFFF"/>
-                </a:solidFill>
-                <a:latin typeface="Calibri" pitchFamily="34" charset="0"/>
-                <a:ea typeface="WenQuanYi Micro Hei" charset="0"/>
-                <a:cs typeface="Calibri" pitchFamily="34" charset="0"/>
-              </a:rPr>
-              <a:t>naglasak je na hijerarhiji s vođom na čelu</a:t>
+              <a:t>vlast obnaša jedna obitelj, mala skupina ljudi ili snažna politička stranka (prisutno višestranačje)</a:t>
             </a:r>
           </a:p>
           <a:p>
             <a:pPr marL="457200" indent="-457200" hangingPunct="0">
+              <a:lnSpc>
+                <a:spcPct val="100000"/>
+              </a:lnSpc>
               <a:spcBef>
                 <a:spcPts val="1200"/>
               </a:spcBef>
@@ -12395,7 +12135,142 @@
               <a:defRPr/>
             </a:pPr>
             <a:r>
-              <a:rPr lang="hr-HR" sz="2400" i="1">
+              <a:rPr lang="hr-HR" sz="2800" b="1" dirty="0">
+                <a:solidFill>
+                  <a:srgbClr val="FFC000"/>
+                </a:solidFill>
+                <a:effectLst>
+                  <a:outerShdw blurRad="38100" dist="38100" dir="2700000" algn="tl">
+                    <a:srgbClr val="000000">
+                      <a:alpha val="43137"/>
+                    </a:srgbClr>
+                  </a:outerShdw>
+                </a:effectLst>
+                <a:latin typeface="Calibri" pitchFamily="34" charset="0"/>
+                <a:ea typeface="WenQuanYi Micro Hei" charset="0"/>
+                <a:cs typeface="Calibri" pitchFamily="34" charset="0"/>
+              </a:rPr>
+              <a:t>karakteristike autoritarizma</a:t>
+            </a:r>
+          </a:p>
+          <a:p>
+            <a:pPr marL="1200150" lvl="1" indent="-457200" hangingPunct="0">
+              <a:lnSpc>
+                <a:spcPct val="100000"/>
+              </a:lnSpc>
+              <a:spcBef>
+                <a:spcPts val="600"/>
+              </a:spcBef>
+              <a:buClr>
+                <a:schemeClr val="tx1"/>
+              </a:buClr>
+              <a:buSzPct val="100000"/>
+              <a:buFont typeface="Arial" pitchFamily="34" charset="0"/>
+              <a:buChar char="–"/>
+              <a:tabLst>
+                <a:tab pos="723900" algn="l"/>
+                <a:tab pos="1447800" algn="l"/>
+                <a:tab pos="2171700" algn="l"/>
+                <a:tab pos="2895600" algn="l"/>
+                <a:tab pos="3619500" algn="l"/>
+                <a:tab pos="4343400" algn="l"/>
+                <a:tab pos="5067300" algn="l"/>
+                <a:tab pos="5791200" algn="l"/>
+                <a:tab pos="6515100" algn="l"/>
+                <a:tab pos="7239000" algn="l"/>
+                <a:tab pos="7962900" algn="l"/>
+                <a:tab pos="8686800" algn="l"/>
+              </a:tabLst>
+              <a:defRPr/>
+            </a:pPr>
+            <a:r>
+              <a:rPr lang="hr-HR" sz="2400" dirty="0">
+                <a:latin typeface="Calibri" pitchFamily="34" charset="0"/>
+                <a:ea typeface="WenQuanYi Micro Hei" charset="0"/>
+                <a:cs typeface="Calibri" pitchFamily="34" charset="0"/>
+              </a:rPr>
+              <a:t>značajna uloga vojske</a:t>
+            </a:r>
+          </a:p>
+          <a:p>
+            <a:pPr marL="1200150" lvl="1" indent="-457200" hangingPunct="0">
+              <a:lnSpc>
+                <a:spcPct val="100000"/>
+              </a:lnSpc>
+              <a:spcBef>
+                <a:spcPts val="600"/>
+              </a:spcBef>
+              <a:buClr>
+                <a:schemeClr val="tx1"/>
+              </a:buClr>
+              <a:buSzPct val="100000"/>
+              <a:buFont typeface="Arial" pitchFamily="34" charset="0"/>
+              <a:buChar char="–"/>
+              <a:tabLst>
+                <a:tab pos="723900" algn="l"/>
+                <a:tab pos="1447800" algn="l"/>
+                <a:tab pos="2171700" algn="l"/>
+                <a:tab pos="2895600" algn="l"/>
+                <a:tab pos="3619500" algn="l"/>
+                <a:tab pos="4343400" algn="l"/>
+                <a:tab pos="5067300" algn="l"/>
+                <a:tab pos="5791200" algn="l"/>
+                <a:tab pos="6515100" algn="l"/>
+                <a:tab pos="7239000" algn="l"/>
+                <a:tab pos="7962900" algn="l"/>
+                <a:tab pos="8686800" algn="l"/>
+              </a:tabLst>
+              <a:defRPr/>
+            </a:pPr>
+            <a:r>
+              <a:rPr lang="hr-HR" sz="2400" dirty="0">
+                <a:latin typeface="Calibri" pitchFamily="34" charset="0"/>
+                <a:ea typeface="WenQuanYi Micro Hei" charset="0"/>
+                <a:cs typeface="Calibri" pitchFamily="34" charset="0"/>
+              </a:rPr>
+              <a:t>ne nastoji nadzirati sve vidove dr. života</a:t>
+            </a:r>
+          </a:p>
+          <a:p>
+            <a:pPr marL="1200150" lvl="1" indent="-457200" hangingPunct="0">
+              <a:lnSpc>
+                <a:spcPct val="100000"/>
+              </a:lnSpc>
+              <a:spcBef>
+                <a:spcPts val="600"/>
+              </a:spcBef>
+              <a:buClr>
+                <a:schemeClr val="tx1"/>
+              </a:buClr>
+              <a:buSzPct val="100000"/>
+              <a:buFont typeface="Arial" pitchFamily="34" charset="0"/>
+              <a:buChar char="–"/>
+              <a:tabLst>
+                <a:tab pos="723900" algn="l"/>
+                <a:tab pos="1447800" algn="l"/>
+                <a:tab pos="2171700" algn="l"/>
+                <a:tab pos="2895600" algn="l"/>
+                <a:tab pos="3619500" algn="l"/>
+                <a:tab pos="4343400" algn="l"/>
+                <a:tab pos="5067300" algn="l"/>
+                <a:tab pos="5791200" algn="l"/>
+                <a:tab pos="6515100" algn="l"/>
+                <a:tab pos="7239000" algn="l"/>
+                <a:tab pos="7962900" algn="l"/>
+                <a:tab pos="8686800" algn="l"/>
+              </a:tabLst>
+              <a:defRPr/>
+            </a:pPr>
+            <a:r>
+              <a:rPr lang="hr-HR" sz="2400" dirty="0">
+                <a:latin typeface="Calibri" pitchFamily="34" charset="0"/>
+                <a:ea typeface="WenQuanYi Micro Hei" charset="0"/>
+                <a:cs typeface="Calibri" pitchFamily="34" charset="0"/>
+              </a:rPr>
+              <a:t>ekonomska, religijska, kulturna i obiteljska pitanja </a:t>
+            </a:r>
+            <a:r>
+              <a:rPr lang="hr-HR" sz="2400" dirty="0">
                 <a:solidFill>
                   <a:srgbClr val="FFFFFF"/>
                 </a:solidFill>
@@ -12403,11 +12278,56 @@
                 <a:ea typeface="WenQuanYi Micro Hei" charset="0"/>
                 <a:cs typeface="Calibri" pitchFamily="34" charset="0"/>
               </a:rPr>
-              <a:t>primjer: Španjolska za vrijeme Franka</a:t>
+              <a:t>prepuštena su individualnom odlučivanju</a:t>
+            </a:r>
+          </a:p>
+          <a:p>
+            <a:pPr marL="1200150" lvl="1" indent="-457200" hangingPunct="0">
+              <a:lnSpc>
+                <a:spcPct val="100000"/>
+              </a:lnSpc>
+              <a:spcBef>
+                <a:spcPts val="600"/>
+              </a:spcBef>
+              <a:buClr>
+                <a:schemeClr val="tx1"/>
+              </a:buClr>
+              <a:buSzPct val="100000"/>
+              <a:buFont typeface="Arial" pitchFamily="34" charset="0"/>
+              <a:buChar char="–"/>
+              <a:tabLst>
+                <a:tab pos="723900" algn="l"/>
+                <a:tab pos="1447800" algn="l"/>
+                <a:tab pos="2171700" algn="l"/>
+                <a:tab pos="2895600" algn="l"/>
+                <a:tab pos="3619500" algn="l"/>
+                <a:tab pos="4343400" algn="l"/>
+                <a:tab pos="5067300" algn="l"/>
+                <a:tab pos="5791200" algn="l"/>
+                <a:tab pos="6515100" algn="l"/>
+                <a:tab pos="7239000" algn="l"/>
+                <a:tab pos="7962900" algn="l"/>
+                <a:tab pos="8686800" algn="l"/>
+              </a:tabLst>
+              <a:defRPr/>
+            </a:pPr>
+            <a:r>
+              <a:rPr lang="hr-HR" sz="2400" dirty="0">
+                <a:solidFill>
+                  <a:srgbClr val="FFFFFF"/>
+                </a:solidFill>
+                <a:latin typeface="Calibri" pitchFamily="34" charset="0"/>
+                <a:ea typeface="WenQuanYi Micro Hei" charset="0"/>
+                <a:cs typeface="Calibri" pitchFamily="34" charset="0"/>
+              </a:rPr>
+              <a:t>naglasak je na hijerarhiji s vođom na čelu</a:t>
             </a:r>
           </a:p>
           <a:p>
             <a:pPr marL="457200" indent="-457200" hangingPunct="0">
+              <a:lnSpc>
+                <a:spcPct val="100000"/>
+              </a:lnSpc>
               <a:spcBef>
                 <a:spcPts val="2400"/>
               </a:spcBef>
@@ -12434,7 +12354,68 @@
               <a:defRPr/>
             </a:pPr>
             <a:r>
-              <a:rPr lang="hr-HR" sz="2400">
+              <a:rPr lang="hr-HR" sz="2400" i="1" dirty="0">
+                <a:solidFill>
+                  <a:srgbClr val="FFFFFF"/>
+                </a:solidFill>
+                <a:latin typeface="Calibri" pitchFamily="34" charset="0"/>
+                <a:ea typeface="WenQuanYi Micro Hei" charset="0"/>
+                <a:cs typeface="Calibri" pitchFamily="34" charset="0"/>
+              </a:rPr>
+              <a:t>primjer: Španjolska za vrijeme </a:t>
+            </a:r>
+            <a:r>
+              <a:rPr lang="hr-HR" sz="2400" i="1" dirty="0" smtClean="0">
+                <a:solidFill>
+                  <a:srgbClr val="FFFFFF"/>
+                </a:solidFill>
+                <a:latin typeface="Calibri" pitchFamily="34" charset="0"/>
+                <a:ea typeface="WenQuanYi Micro Hei" charset="0"/>
+                <a:cs typeface="Calibri" pitchFamily="34" charset="0"/>
+              </a:rPr>
+              <a:t>Franca</a:t>
+            </a:r>
+            <a:endParaRPr lang="hr-HR" sz="2400" i="1" dirty="0">
+              <a:solidFill>
+                <a:srgbClr val="FFFFFF"/>
+              </a:solidFill>
+              <a:latin typeface="Calibri" pitchFamily="34" charset="0"/>
+              <a:ea typeface="WenQuanYi Micro Hei" charset="0"/>
+              <a:cs typeface="Calibri" pitchFamily="34" charset="0"/>
+            </a:endParaRPr>
+          </a:p>
+          <a:p>
+            <a:pPr marL="457200" indent="-457200" hangingPunct="0">
+              <a:lnSpc>
+                <a:spcPct val="100000"/>
+              </a:lnSpc>
+              <a:spcBef>
+                <a:spcPts val="1200"/>
+              </a:spcBef>
+              <a:buClr>
+                <a:schemeClr val="tx1"/>
+              </a:buClr>
+              <a:buSzPct val="100000"/>
+              <a:buFont typeface="Arial" pitchFamily="34" charset="0"/>
+              <a:buChar char="–"/>
+              <a:tabLst>
+                <a:tab pos="723900" algn="l"/>
+                <a:tab pos="1447800" algn="l"/>
+                <a:tab pos="2171700" algn="l"/>
+                <a:tab pos="2895600" algn="l"/>
+                <a:tab pos="3619500" algn="l"/>
+                <a:tab pos="4343400" algn="l"/>
+                <a:tab pos="5067300" algn="l"/>
+                <a:tab pos="5791200" algn="l"/>
+                <a:tab pos="6515100" algn="l"/>
+                <a:tab pos="7239000" algn="l"/>
+                <a:tab pos="7962900" algn="l"/>
+                <a:tab pos="8686800" algn="l"/>
+              </a:tabLst>
+              <a:defRPr/>
+            </a:pPr>
+            <a:r>
+              <a:rPr lang="hr-HR" sz="2400" dirty="0">
                 <a:solidFill>
                   <a:srgbClr val="FFFFFF"/>
                 </a:solidFill>
@@ -12473,17 +12454,22 @@
         </p:txBody>
       </p:sp>
     </p:spTree>
+    <p:extLst>
+      <p:ext uri="{BB962C8B-B14F-4D97-AF65-F5344CB8AC3E}">
+        <p14:creationId xmlns:p14="http://schemas.microsoft.com/office/powerpoint/2010/main" val="4175876130"/>
+      </p:ext>
+    </p:extLst>
   </p:cSld>
   <p:clrMapOvr>
     <a:masterClrMapping/>
   </p:clrMapOvr>
-  <mc:AlternateContent xmlns:mc="http://schemas.openxmlformats.org/markup-compatibility/2006">
-    <mc:Choice xmlns:p14="http://schemas.microsoft.com/office/powerpoint/2010/main" Requires="p14">
+  <mc:AlternateContent xmlns:mc="http://schemas.openxmlformats.org/markup-compatibility/2006" xmlns:p14="http://schemas.microsoft.com/office/powerpoint/2010/main">
+    <mc:Choice Requires="p14">
       <p:transition>
         <p14:reveal/>
       </p:transition>
     </mc:Choice>
-    <mc:Fallback>
+    <mc:Fallback xmlns="">
       <p:transition>
         <p:fade/>
       </p:transition>
@@ -13000,7 +12986,7 @@
 </file>
 
 <file path=ppt/slides/slide13.xml><?xml version="1.0" encoding="utf-8"?>
-<p:sld xmlns:a="http://schemas.openxmlformats.org/drawingml/2006/main" xmlns:r="http://schemas.openxmlformats.org/officeDocument/2006/relationships" xmlns:p="http://schemas.openxmlformats.org/presentationml/2006/main">
+<p:sld xmlns:a="http://schemas.openxmlformats.org/drawingml/2006/main" xmlns:r="http://schemas.openxmlformats.org/officeDocument/2006/relationships" xmlns:p="http://schemas.openxmlformats.org/presentationml/2006/main" show="0">
   <p:cSld>
     <p:spTree>
       <p:nvGrpSpPr>
@@ -13927,17 +13913,22 @@
         </p:txBody>
       </p:sp>
     </p:spTree>
+    <p:extLst>
+      <p:ext uri="{BB962C8B-B14F-4D97-AF65-F5344CB8AC3E}">
+        <p14:creationId xmlns:p14="http://schemas.microsoft.com/office/powerpoint/2010/main" val="3294389413"/>
+      </p:ext>
+    </p:extLst>
   </p:cSld>
   <p:clrMapOvr>
     <a:masterClrMapping/>
   </p:clrMapOvr>
-  <mc:AlternateContent xmlns:mc="http://schemas.openxmlformats.org/markup-compatibility/2006">
-    <mc:Choice xmlns:p14="http://schemas.microsoft.com/office/powerpoint/2010/main" Requires="p14">
+  <mc:AlternateContent xmlns:mc="http://schemas.openxmlformats.org/markup-compatibility/2006" xmlns:p14="http://schemas.microsoft.com/office/powerpoint/2010/main">
+    <mc:Choice Requires="p14">
       <p:transition>
         <p14:reveal/>
       </p:transition>
     </mc:Choice>
-    <mc:Fallback>
+    <mc:Fallback xmlns="">
       <p:transition>
         <p:fade/>
       </p:transition>
@@ -15685,7 +15676,7 @@
         </p:nvSpPr>
         <p:spPr>
           <a:xfrm>
-            <a:off x="571472" y="1143006"/>
+            <a:off x="571472" y="1052736"/>
             <a:ext cx="6572237" cy="1015663"/>
           </a:xfrm>
           <a:prstGeom prst="rect">
@@ -15699,6 +15690,9 @@
           <a:lstStyle/>
           <a:p>
             <a:pPr marL="288000" indent="-288000" hangingPunct="0">
+              <a:lnSpc>
+                <a:spcPct val="100000"/>
+              </a:lnSpc>
               <a:spcBef>
                 <a:spcPts val="0"/>
               </a:spcBef>
@@ -15735,6 +15729,9 @@
           </a:p>
           <a:p>
             <a:pPr marL="288000" indent="-288000" hangingPunct="0">
+              <a:lnSpc>
+                <a:spcPct val="100000"/>
+              </a:lnSpc>
               <a:spcBef>
                 <a:spcPts val="0"/>
               </a:spcBef>
@@ -15789,6 +15786,9 @@
           </a:p>
           <a:p>
             <a:pPr marL="288000" indent="-288000" hangingPunct="0">
+              <a:lnSpc>
+                <a:spcPct val="100000"/>
+              </a:lnSpc>
               <a:spcBef>
                 <a:spcPts val="0"/>
               </a:spcBef>
@@ -15976,7 +15976,7 @@
         </p:nvSpPr>
         <p:spPr bwMode="auto">
           <a:xfrm>
-            <a:off x="571472" y="3364078"/>
+            <a:off x="571472" y="3273808"/>
             <a:ext cx="8429625" cy="707886"/>
           </a:xfrm>
           <a:prstGeom prst="rect">
@@ -15997,6 +15997,9 @@
           <a:lstStyle/>
           <a:p>
             <a:pPr marL="288000" indent="-288000" hangingPunct="0">
+              <a:lnSpc>
+                <a:spcPct val="100000"/>
+              </a:lnSpc>
               <a:spcBef>
                 <a:spcPts val="0"/>
               </a:spcBef>
@@ -16055,6 +16058,9 @@
           </a:p>
           <a:p>
             <a:pPr marL="288000" indent="-288000" hangingPunct="0">
+              <a:lnSpc>
+                <a:spcPct val="100000"/>
+              </a:lnSpc>
               <a:spcBef>
                 <a:spcPts val="0"/>
               </a:spcBef>
@@ -16145,7 +16151,7 @@
         </p:nvSpPr>
         <p:spPr>
           <a:xfrm>
-            <a:off x="571472" y="4435648"/>
+            <a:off x="571472" y="4345378"/>
             <a:ext cx="8429625" cy="707886"/>
           </a:xfrm>
           <a:prstGeom prst="rect">
@@ -16159,6 +16165,9 @@
           <a:lstStyle/>
           <a:p>
             <a:pPr marL="288000" indent="-288000" hangingPunct="0">
+              <a:lnSpc>
+                <a:spcPct val="100000"/>
+              </a:lnSpc>
               <a:spcBef>
                 <a:spcPts val="0"/>
               </a:spcBef>
@@ -16262,6 +16271,9 @@
           </a:p>
           <a:p>
             <a:pPr marL="288000" indent="-288000" hangingPunct="0">
+              <a:lnSpc>
+                <a:spcPct val="100000"/>
+              </a:lnSpc>
               <a:spcBef>
                 <a:spcPts val="0"/>
               </a:spcBef>
@@ -16349,7 +16361,7 @@
         </p:nvSpPr>
         <p:spPr>
           <a:xfrm>
-            <a:off x="571472" y="5650094"/>
+            <a:off x="571472" y="5445224"/>
             <a:ext cx="8572528" cy="707886"/>
           </a:xfrm>
           <a:prstGeom prst="rect">
@@ -16363,6 +16375,9 @@
           <a:lstStyle/>
           <a:p>
             <a:pPr marL="288000" lvl="0" indent="-288000">
+              <a:lnSpc>
+                <a:spcPct val="100000"/>
+              </a:lnSpc>
               <a:spcBef>
                 <a:spcPts val="0"/>
               </a:spcBef>
@@ -16422,6 +16437,9 @@
           </a:p>
           <a:p>
             <a:pPr marL="288000" lvl="0" indent="-288000">
+              <a:lnSpc>
+                <a:spcPct val="100000"/>
+              </a:lnSpc>
               <a:spcBef>
                 <a:spcPts val="0"/>
               </a:spcBef>
@@ -16479,17 +16497,22 @@
         </p:txBody>
       </p:sp>
     </p:spTree>
+    <p:extLst>
+      <p:ext uri="{BB962C8B-B14F-4D97-AF65-F5344CB8AC3E}">
+        <p14:creationId xmlns:p14="http://schemas.microsoft.com/office/powerpoint/2010/main" val="2589982607"/>
+      </p:ext>
+    </p:extLst>
   </p:cSld>
   <p:clrMapOvr>
     <a:masterClrMapping/>
   </p:clrMapOvr>
-  <mc:AlternateContent xmlns:mc="http://schemas.openxmlformats.org/markup-compatibility/2006">
-    <mc:Choice xmlns:p14="http://schemas.microsoft.com/office/powerpoint/2010/main" Requires="p14">
+  <mc:AlternateContent xmlns:mc="http://schemas.openxmlformats.org/markup-compatibility/2006" xmlns:p14="http://schemas.microsoft.com/office/powerpoint/2010/main">
+    <mc:Choice Requires="p14">
       <p:transition>
         <p14:reveal/>
       </p:transition>
     </mc:Choice>
-    <mc:Fallback>
+    <mc:Fallback xmlns="">
       <p:transition>
         <p:fade/>
       </p:transition>
@@ -17362,12 +17385,12 @@
       </p:par>
     </p:tnLst>
     <p:bldLst>
-      <p:bldP spid="24578" grpId="0" uiExpand="1" build="allAtOnce"/>
+      <p:bldP spid="24578" grpId="0" build="allAtOnce"/>
       <p:bldP spid="6" grpId="0" build="allAtOnce"/>
       <p:bldP spid="7" grpId="0" build="allAtOnce"/>
       <p:bldP spid="8" grpId="0" build="allAtOnce"/>
-      <p:bldP spid="9" grpId="0" uiExpand="1" build="allAtOnce"/>
-      <p:bldP spid="11" grpId="0" uiExpand="1" build="p"/>
+      <p:bldP spid="9" grpId="0" build="allAtOnce"/>
+      <p:bldP spid="11" grpId="0" build="p"/>
     </p:bldLst>
   </p:timing>
 </p:sld>
@@ -17949,17 +17972,22 @@
         </p:txBody>
       </p:sp>
     </p:spTree>
+    <p:extLst>
+      <p:ext uri="{BB962C8B-B14F-4D97-AF65-F5344CB8AC3E}">
+        <p14:creationId xmlns:p14="http://schemas.microsoft.com/office/powerpoint/2010/main" val="3725870561"/>
+      </p:ext>
+    </p:extLst>
   </p:cSld>
   <p:clrMapOvr>
     <a:masterClrMapping/>
   </p:clrMapOvr>
-  <mc:AlternateContent xmlns:mc="http://schemas.openxmlformats.org/markup-compatibility/2006">
-    <mc:Choice xmlns:p14="http://schemas.microsoft.com/office/powerpoint/2010/main" Requires="p14">
+  <mc:AlternateContent xmlns:mc="http://schemas.openxmlformats.org/markup-compatibility/2006" xmlns:p14="http://schemas.microsoft.com/office/powerpoint/2010/main">
+    <mc:Choice Requires="p14">
       <p:transition>
         <p14:reveal/>
       </p:transition>
     </mc:Choice>
-    <mc:Fallback>
+    <mc:Fallback xmlns="">
       <p:transition>
         <p:fade/>
       </p:transition>
@@ -18277,8 +18305,8 @@
       </p:par>
     </p:tnLst>
     <p:bldLst>
-      <p:bldP spid="16" grpId="0" uiExpand="1" build="allAtOnce" animBg="1"/>
-      <p:bldP spid="17" grpId="0" uiExpand="1" build="allAtOnce" animBg="1"/>
+      <p:bldP spid="16" grpId="0" build="allAtOnce" animBg="1"/>
+      <p:bldP spid="17" grpId="0" build="allAtOnce" animBg="1"/>
     </p:bldLst>
   </p:timing>
 </p:sld>
@@ -18973,17 +19001,22 @@
         </p:txBody>
       </p:sp>
     </p:spTree>
+    <p:extLst>
+      <p:ext uri="{BB962C8B-B14F-4D97-AF65-F5344CB8AC3E}">
+        <p14:creationId xmlns:p14="http://schemas.microsoft.com/office/powerpoint/2010/main" val="1832724498"/>
+      </p:ext>
+    </p:extLst>
   </p:cSld>
   <p:clrMapOvr>
     <a:masterClrMapping/>
   </p:clrMapOvr>
-  <mc:AlternateContent xmlns:mc="http://schemas.openxmlformats.org/markup-compatibility/2006">
-    <mc:Choice xmlns:p14="http://schemas.microsoft.com/office/powerpoint/2010/main" Requires="p14">
+  <mc:AlternateContent xmlns:mc="http://schemas.openxmlformats.org/markup-compatibility/2006" xmlns:p14="http://schemas.microsoft.com/office/powerpoint/2010/main">
+    <mc:Choice Requires="p14">
       <p:transition>
         <p14:reveal/>
       </p:transition>
     </mc:Choice>
-    <mc:Fallback>
+    <mc:Fallback xmlns="">
       <p:transition>
         <p:fade/>
       </p:transition>
@@ -19508,7 +19541,7 @@
       </p:par>
     </p:tnLst>
     <p:bldLst>
-      <p:bldP spid="24578" grpId="0" uiExpand="1" build="allAtOnce"/>
+      <p:bldP spid="24578" grpId="0" build="allAtOnce"/>
     </p:bldLst>
   </p:timing>
 </p:sld>
@@ -21564,17 +21597,22 @@
         </p:sp>
       </p:grpSp>
     </p:spTree>
+    <p:extLst>
+      <p:ext uri="{BB962C8B-B14F-4D97-AF65-F5344CB8AC3E}">
+        <p14:creationId xmlns:p14="http://schemas.microsoft.com/office/powerpoint/2010/main" val="254569201"/>
+      </p:ext>
+    </p:extLst>
   </p:cSld>
   <p:clrMapOvr>
     <a:masterClrMapping/>
   </p:clrMapOvr>
-  <mc:AlternateContent xmlns:mc="http://schemas.openxmlformats.org/markup-compatibility/2006">
-    <mc:Choice xmlns:p14="http://schemas.microsoft.com/office/powerpoint/2010/main" Requires="p14">
+  <mc:AlternateContent xmlns:mc="http://schemas.openxmlformats.org/markup-compatibility/2006" xmlns:p14="http://schemas.microsoft.com/office/powerpoint/2010/main">
+    <mc:Choice Requires="p14">
       <p:transition>
         <p14:reveal/>
       </p:transition>
     </mc:Choice>
-    <mc:Fallback>
+    <mc:Fallback xmlns="">
       <p:transition>
         <p:fade/>
       </p:transition>
@@ -23036,17 +23074,22 @@
         </p:txBody>
       </p:sp>
     </p:spTree>
+    <p:extLst>
+      <p:ext uri="{BB962C8B-B14F-4D97-AF65-F5344CB8AC3E}">
+        <p14:creationId xmlns:p14="http://schemas.microsoft.com/office/powerpoint/2010/main" val="2765920873"/>
+      </p:ext>
+    </p:extLst>
   </p:cSld>
   <p:clrMapOvr>
     <a:masterClrMapping/>
   </p:clrMapOvr>
-  <mc:AlternateContent xmlns:mc="http://schemas.openxmlformats.org/markup-compatibility/2006">
-    <mc:Choice xmlns:p14="http://schemas.microsoft.com/office/powerpoint/2010/main" Requires="p14">
+  <mc:AlternateContent xmlns:mc="http://schemas.openxmlformats.org/markup-compatibility/2006" xmlns:p14="http://schemas.microsoft.com/office/powerpoint/2010/main">
+    <mc:Choice Requires="p14">
       <p:transition>
         <p14:reveal/>
       </p:transition>
     </mc:Choice>
-    <mc:Fallback>
+    <mc:Fallback xmlns="">
       <p:transition>
         <p:fade/>
       </p:transition>
@@ -24006,17 +24049,22 @@
         </p:txBody>
       </p:sp>
     </p:spTree>
+    <p:extLst>
+      <p:ext uri="{BB962C8B-B14F-4D97-AF65-F5344CB8AC3E}">
+        <p14:creationId xmlns:p14="http://schemas.microsoft.com/office/powerpoint/2010/main" val="2190710498"/>
+      </p:ext>
+    </p:extLst>
   </p:cSld>
   <p:clrMapOvr>
     <a:masterClrMapping/>
   </p:clrMapOvr>
-  <mc:AlternateContent xmlns:mc="http://schemas.openxmlformats.org/markup-compatibility/2006">
-    <mc:Choice xmlns:p14="http://schemas.microsoft.com/office/powerpoint/2010/main" Requires="p14">
+  <mc:AlternateContent xmlns:mc="http://schemas.openxmlformats.org/markup-compatibility/2006" xmlns:p14="http://schemas.microsoft.com/office/powerpoint/2010/main">
+    <mc:Choice Requires="p14">
       <p:transition>
         <p14:reveal/>
       </p:transition>
     </mc:Choice>
-    <mc:Fallback>
+    <mc:Fallback xmlns="">
       <p:transition>
         <p:fade/>
       </p:transition>
@@ -24541,7 +24589,7 @@
       </p:par>
     </p:tnLst>
     <p:bldLst>
-      <p:bldP spid="24578" grpId="0" uiExpand="1" build="allAtOnce"/>
+      <p:bldP spid="24578" grpId="0" build="allAtOnce"/>
     </p:bldLst>
   </p:timing>
 </p:sld>
@@ -24594,6 +24642,9 @@
           <a:lstStyle/>
           <a:p>
             <a:pPr marL="360000" indent="-360000" hangingPunct="0">
+              <a:lnSpc>
+                <a:spcPts val="4200"/>
+              </a:lnSpc>
               <a:spcBef>
                 <a:spcPts val="1800"/>
               </a:spcBef>
@@ -24735,7 +24786,25 @@
                 <a:ea typeface="WenQuanYi Micro Hei" charset="0"/>
                 <a:cs typeface="Calibri" pitchFamily="34" charset="0"/>
               </a:rPr>
-              <a:t>uređen odnos između zakonodavne</a:t>
+              <a:t>uređen odnos između </a:t>
+            </a:r>
+            <a:r>
+              <a:rPr lang="vi-VN" sz="2800" b="1" dirty="0" smtClean="0">
+                <a:solidFill>
+                  <a:srgbClr val="FFC000"/>
+                </a:solidFill>
+                <a:effectLst>
+                  <a:outerShdw blurRad="38100" dist="38100" dir="2700000" algn="tl">
+                    <a:srgbClr val="000000">
+                      <a:alpha val="43137"/>
+                    </a:srgbClr>
+                  </a:outerShdw>
+                </a:effectLst>
+                <a:latin typeface="Calibri" pitchFamily="34" charset="0"/>
+                <a:ea typeface="WenQuanYi Micro Hei" charset="0"/>
+                <a:cs typeface="Calibri" pitchFamily="34" charset="0"/>
+              </a:rPr>
+              <a:t>zakonodavne</a:t>
             </a:r>
             <a:r>
               <a:rPr lang="hr-HR" sz="2800" b="1" dirty="0">
@@ -24881,6 +24950,9 @@
           </a:p>
           <a:p>
             <a:pPr marL="1431000" lvl="2" indent="-288000" hangingPunct="0">
+              <a:lnSpc>
+                <a:spcPct val="100000"/>
+              </a:lnSpc>
               <a:spcBef>
                 <a:spcPts val="600"/>
               </a:spcBef>
@@ -24917,6 +24989,9 @@
           </a:p>
           <a:p>
             <a:pPr marL="1431000" lvl="2" indent="-288000" hangingPunct="0">
+              <a:lnSpc>
+                <a:spcPct val="100000"/>
+              </a:lnSpc>
               <a:spcBef>
                 <a:spcPts val="600"/>
               </a:spcBef>
@@ -24953,6 +25028,9 @@
           </a:p>
           <a:p>
             <a:pPr marL="1431000" lvl="2" indent="-288000" hangingPunct="0">
+              <a:lnSpc>
+                <a:spcPct val="100000"/>
+              </a:lnSpc>
               <a:spcBef>
                 <a:spcPts val="600"/>
               </a:spcBef>
@@ -24989,6 +25067,9 @@
           </a:p>
           <a:p>
             <a:pPr marL="1431000" lvl="2" indent="-288000" hangingPunct="0">
+              <a:lnSpc>
+                <a:spcPct val="100000"/>
+              </a:lnSpc>
               <a:spcBef>
                 <a:spcPts val="600"/>
               </a:spcBef>
@@ -25030,6 +25111,9 @@
           </a:p>
           <a:p>
             <a:pPr marL="1431000" lvl="2" indent="-288000" hangingPunct="0">
+              <a:lnSpc>
+                <a:spcPct val="100000"/>
+              </a:lnSpc>
               <a:spcBef>
                 <a:spcPts val="600"/>
               </a:spcBef>
@@ -25092,17 +25176,22 @@
         </p:txBody>
       </p:sp>
     </p:spTree>
+    <p:extLst>
+      <p:ext uri="{BB962C8B-B14F-4D97-AF65-F5344CB8AC3E}">
+        <p14:creationId xmlns:p14="http://schemas.microsoft.com/office/powerpoint/2010/main" val="1257307486"/>
+      </p:ext>
+    </p:extLst>
   </p:cSld>
   <p:clrMapOvr>
     <a:masterClrMapping/>
   </p:clrMapOvr>
-  <mc:AlternateContent xmlns:mc="http://schemas.openxmlformats.org/markup-compatibility/2006">
-    <mc:Choice xmlns:p14="http://schemas.microsoft.com/office/powerpoint/2010/main" Requires="p14">
+  <mc:AlternateContent xmlns:mc="http://schemas.openxmlformats.org/markup-compatibility/2006" xmlns:p14="http://schemas.microsoft.com/office/powerpoint/2010/main">
+    <mc:Choice Requires="p14">
       <p:transition>
         <p14:reveal/>
       </p:transition>
     </mc:Choice>
-    <mc:Fallback>
+    <mc:Fallback xmlns="">
       <p:transition>
         <p:fade/>
       </p:transition>
@@ -25287,24 +25376,15 @@
                                   </p:childTnLst>
                                 </p:cTn>
                               </p:par>
-                            </p:childTnLst>
-                          </p:cTn>
-                        </p:par>
-                        <p:par>
-                          <p:cTn id="17" fill="hold">
-                            <p:stCondLst>
-                              <p:cond delay="500"/>
-                            </p:stCondLst>
-                            <p:childTnLst>
                               <p:par>
-                                <p:cTn id="18" presetID="10" presetClass="entr" presetSubtype="0" fill="hold" grpId="0" nodeType="afterEffect">
+                                <p:cTn id="17" presetID="10" presetClass="entr" presetSubtype="0" fill="hold" grpId="0" nodeType="withEffect">
                                   <p:stCondLst>
                                     <p:cond delay="0"/>
                                   </p:stCondLst>
                                   <p:childTnLst>
                                     <p:set>
                                       <p:cBhvr>
-                                        <p:cTn id="19" dur="1" fill="hold">
+                                        <p:cTn id="18" dur="1" fill="hold">
                                           <p:stCondLst>
                                             <p:cond delay="0"/>
                                           </p:stCondLst>
@@ -25326,7 +25406,7 @@
                                     </p:set>
                                     <p:animEffect transition="in" filter="fade">
                                       <p:cBhvr>
-                                        <p:cTn id="20" dur="250"/>
+                                        <p:cTn id="19" dur="250"/>
                                         <p:tgtEl>
                                           <p:spTgt spid="24578">
                                             <p:txEl>
@@ -25339,24 +25419,15 @@
                                   </p:childTnLst>
                                 </p:cTn>
                               </p:par>
-                            </p:childTnLst>
-                          </p:cTn>
-                        </p:par>
-                        <p:par>
-                          <p:cTn id="21" fill="hold">
-                            <p:stCondLst>
-                              <p:cond delay="750"/>
-                            </p:stCondLst>
-                            <p:childTnLst>
                               <p:par>
-                                <p:cTn id="22" presetID="10" presetClass="entr" presetSubtype="0" fill="hold" grpId="0" nodeType="afterEffect">
+                                <p:cTn id="20" presetID="10" presetClass="entr" presetSubtype="0" fill="hold" grpId="0" nodeType="withEffect">
                                   <p:stCondLst>
                                     <p:cond delay="0"/>
                                   </p:stCondLst>
                                   <p:childTnLst>
                                     <p:set>
                                       <p:cBhvr>
-                                        <p:cTn id="23" dur="1" fill="hold">
+                                        <p:cTn id="21" dur="1" fill="hold">
                                           <p:stCondLst>
                                             <p:cond delay="0"/>
                                           </p:stCondLst>
@@ -25378,7 +25449,7 @@
                                     </p:set>
                                     <p:animEffect transition="in" filter="fade">
                                       <p:cBhvr>
-                                        <p:cTn id="24" dur="250"/>
+                                        <p:cTn id="22" dur="250"/>
                                         <p:tgtEl>
                                           <p:spTgt spid="24578">
                                             <p:txEl>
@@ -25391,23 +25462,57 @@
                                   </p:childTnLst>
                                 </p:cTn>
                               </p:par>
-                            </p:childTnLst>
-                          </p:cTn>
-                        </p:par>
-                        <p:par>
-                          <p:cTn id="25" fill="hold">
-                            <p:stCondLst>
-                              <p:cond delay="1000"/>
-                            </p:stCondLst>
-                            <p:childTnLst>
                               <p:par>
-                                <p:cTn id="26" presetID="10" presetClass="entr" presetSubtype="0" fill="hold" grpId="0" nodeType="afterEffect">
+                                <p:cTn id="23" presetID="10" presetClass="entr" presetSubtype="0" fill="hold" grpId="0" nodeType="withEffect">
                                   <p:stCondLst>
                                     <p:cond delay="0"/>
                                   </p:stCondLst>
                                   <p:childTnLst>
                                     <p:set>
                                       <p:cBhvr>
+                                        <p:cTn id="24" dur="1" fill="hold">
+                                          <p:stCondLst>
+                                            <p:cond delay="0"/>
+                                          </p:stCondLst>
+                                        </p:cTn>
+                                        <p:tgtEl>
+                                          <p:spTgt spid="24578">
+                                            <p:txEl>
+                                              <p:pRg st="6" end="6"/>
+                                            </p:txEl>
+                                          </p:spTgt>
+                                        </p:tgtEl>
+                                        <p:attrNameLst>
+                                          <p:attrName>style.visibility</p:attrName>
+                                        </p:attrNameLst>
+                                      </p:cBhvr>
+                                      <p:to>
+                                        <p:strVal val="visible"/>
+                                      </p:to>
+                                    </p:set>
+                                    <p:animEffect transition="in" filter="fade">
+                                      <p:cBhvr>
+                                        <p:cTn id="25" dur="250"/>
+                                        <p:tgtEl>
+                                          <p:spTgt spid="24578">
+                                            <p:txEl>
+                                              <p:pRg st="6" end="6"/>
+                                            </p:txEl>
+                                          </p:spTgt>
+                                        </p:tgtEl>
+                                      </p:cBhvr>
+                                    </p:animEffect>
+                                  </p:childTnLst>
+                                </p:cTn>
+                              </p:par>
+                              <p:par>
+                                <p:cTn id="26" presetID="10" presetClass="entr" presetSubtype="0" fill="hold" grpId="0" nodeType="withEffect">
+                                  <p:stCondLst>
+                                    <p:cond delay="0"/>
+                                  </p:stCondLst>
+                                  <p:childTnLst>
+                                    <p:set>
+                                      <p:cBhvr>
                                         <p:cTn id="27" dur="1" fill="hold">
                                           <p:stCondLst>
                                             <p:cond delay="0"/>
@@ -25416,7 +25521,7 @@
                                         <p:tgtEl>
                                           <p:spTgt spid="24578">
                                             <p:txEl>
-                                              <p:pRg st="6" end="6"/>
+                                              <p:pRg st="7" end="7"/>
                                             </p:txEl>
                                           </p:spTgt>
                                         </p:tgtEl>
@@ -25431,58 +25536,6 @@
                                     <p:animEffect transition="in" filter="fade">
                                       <p:cBhvr>
                                         <p:cTn id="28" dur="250"/>
-                                        <p:tgtEl>
-                                          <p:spTgt spid="24578">
-                                            <p:txEl>
-                                              <p:pRg st="6" end="6"/>
-                                            </p:txEl>
-                                          </p:spTgt>
-                                        </p:tgtEl>
-                                      </p:cBhvr>
-                                    </p:animEffect>
-                                  </p:childTnLst>
-                                </p:cTn>
-                              </p:par>
-                            </p:childTnLst>
-                          </p:cTn>
-                        </p:par>
-                        <p:par>
-                          <p:cTn id="29" fill="hold">
-                            <p:stCondLst>
-                              <p:cond delay="1250"/>
-                            </p:stCondLst>
-                            <p:childTnLst>
-                              <p:par>
-                                <p:cTn id="30" presetID="10" presetClass="entr" presetSubtype="0" fill="hold" grpId="0" nodeType="afterEffect">
-                                  <p:stCondLst>
-                                    <p:cond delay="0"/>
-                                  </p:stCondLst>
-                                  <p:childTnLst>
-                                    <p:set>
-                                      <p:cBhvr>
-                                        <p:cTn id="31" dur="1" fill="hold">
-                                          <p:stCondLst>
-                                            <p:cond delay="0"/>
-                                          </p:stCondLst>
-                                        </p:cTn>
-                                        <p:tgtEl>
-                                          <p:spTgt spid="24578">
-                                            <p:txEl>
-                                              <p:pRg st="7" end="7"/>
-                                            </p:txEl>
-                                          </p:spTgt>
-                                        </p:tgtEl>
-                                        <p:attrNameLst>
-                                          <p:attrName>style.visibility</p:attrName>
-                                        </p:attrNameLst>
-                                      </p:cBhvr>
-                                      <p:to>
-                                        <p:strVal val="visible"/>
-                                      </p:to>
-                                    </p:set>
-                                    <p:animEffect transition="in" filter="fade">
-                                      <p:cBhvr>
-                                        <p:cTn id="32" dur="250"/>
                                         <p:tgtEl>
                                           <p:spTgt spid="24578">
                                             <p:txEl>
@@ -25523,7 +25576,7 @@
       </p:par>
     </p:tnLst>
     <p:bldLst>
-      <p:bldP spid="24578" grpId="0" uiExpand="1" build="allAtOnce"/>
+      <p:bldP spid="24578" grpId="0" build="allAtOnce"/>
     </p:bldLst>
   </p:timing>
 </p:sld>
@@ -26641,17 +26694,22 @@
         </p:txBody>
       </p:sp>
     </p:spTree>
+    <p:extLst>
+      <p:ext uri="{BB962C8B-B14F-4D97-AF65-F5344CB8AC3E}">
+        <p14:creationId xmlns:p14="http://schemas.microsoft.com/office/powerpoint/2010/main" val="993608100"/>
+      </p:ext>
+    </p:extLst>
   </p:cSld>
   <p:clrMapOvr>
     <a:masterClrMapping/>
   </p:clrMapOvr>
-  <mc:AlternateContent xmlns:mc="http://schemas.openxmlformats.org/markup-compatibility/2006">
-    <mc:Choice xmlns:p14="http://schemas.microsoft.com/office/powerpoint/2010/main" Requires="p14">
+  <mc:AlternateContent xmlns:mc="http://schemas.openxmlformats.org/markup-compatibility/2006" xmlns:p14="http://schemas.microsoft.com/office/powerpoint/2010/main">
+    <mc:Choice Requires="p14">
       <p:transition>
         <p14:reveal/>
       </p:transition>
     </mc:Choice>
-    <mc:Fallback>
+    <mc:Fallback xmlns="">
       <p:transition>
         <p:fade/>
       </p:transition>
@@ -27820,17 +27878,22 @@
         </p:txBody>
       </p:sp>
     </p:spTree>
+    <p:extLst>
+      <p:ext uri="{BB962C8B-B14F-4D97-AF65-F5344CB8AC3E}">
+        <p14:creationId xmlns:p14="http://schemas.microsoft.com/office/powerpoint/2010/main" val="911456101"/>
+      </p:ext>
+    </p:extLst>
   </p:cSld>
   <p:clrMapOvr>
     <a:masterClrMapping/>
   </p:clrMapOvr>
-  <mc:AlternateContent xmlns:mc="http://schemas.openxmlformats.org/markup-compatibility/2006">
-    <mc:Choice xmlns:p14="http://schemas.microsoft.com/office/powerpoint/2010/main" Requires="p14">
+  <mc:AlternateContent xmlns:mc="http://schemas.openxmlformats.org/markup-compatibility/2006" xmlns:p14="http://schemas.microsoft.com/office/powerpoint/2010/main">
+    <mc:Choice Requires="p14">
       <p:transition>
         <p14:reveal/>
       </p:transition>
     </mc:Choice>
-    <mc:Fallback>
+    <mc:Fallback xmlns="">
       <p:transition>
         <p:fade/>
       </p:transition>
@@ -28128,17 +28191,22 @@
         </p:txBody>
       </p:sp>
     </p:spTree>
+    <p:extLst>
+      <p:ext uri="{BB962C8B-B14F-4D97-AF65-F5344CB8AC3E}">
+        <p14:creationId xmlns:p14="http://schemas.microsoft.com/office/powerpoint/2010/main" val="2017380254"/>
+      </p:ext>
+    </p:extLst>
   </p:cSld>
   <p:clrMapOvr>
     <a:masterClrMapping/>
   </p:clrMapOvr>
-  <mc:AlternateContent xmlns:mc="http://schemas.openxmlformats.org/markup-compatibility/2006">
-    <mc:Choice xmlns:p14="http://schemas.microsoft.com/office/powerpoint/2010/main" Requires="p14">
+  <mc:AlternateContent xmlns:mc="http://schemas.openxmlformats.org/markup-compatibility/2006" xmlns:p14="http://schemas.microsoft.com/office/powerpoint/2010/main">
+    <mc:Choice Requires="p14">
       <p:transition>
         <p14:reveal/>
       </p:transition>
     </mc:Choice>
-    <mc:Fallback>
+    <mc:Fallback xmlns="">
       <p:transition>
         <p:fade/>
       </p:transition>
@@ -29593,17 +29661,22 @@
         </p:style>
       </p:cxnSp>
     </p:spTree>
+    <p:extLst>
+      <p:ext uri="{BB962C8B-B14F-4D97-AF65-F5344CB8AC3E}">
+        <p14:creationId xmlns:p14="http://schemas.microsoft.com/office/powerpoint/2010/main" val="386278768"/>
+      </p:ext>
+    </p:extLst>
   </p:cSld>
   <p:clrMapOvr>
     <a:masterClrMapping/>
   </p:clrMapOvr>
-  <mc:AlternateContent xmlns:mc="http://schemas.openxmlformats.org/markup-compatibility/2006">
-    <mc:Choice xmlns:p14="http://schemas.microsoft.com/office/powerpoint/2010/main" Requires="p14">
+  <mc:AlternateContent xmlns:mc="http://schemas.openxmlformats.org/markup-compatibility/2006" xmlns:p14="http://schemas.microsoft.com/office/powerpoint/2010/main">
+    <mc:Choice Requires="p14">
       <p:transition>
         <p14:reveal/>
       </p:transition>
     </mc:Choice>
-    <mc:Fallback>
+    <mc:Fallback xmlns="">
       <p:transition>
         <p:fade/>
       </p:transition>
@@ -30289,17 +30362,22 @@
         </p:txBody>
       </p:sp>
     </p:spTree>
+    <p:extLst>
+      <p:ext uri="{BB962C8B-B14F-4D97-AF65-F5344CB8AC3E}">
+        <p14:creationId xmlns:p14="http://schemas.microsoft.com/office/powerpoint/2010/main" val="2428514935"/>
+      </p:ext>
+    </p:extLst>
   </p:cSld>
   <p:clrMapOvr>
     <a:masterClrMapping/>
   </p:clrMapOvr>
-  <mc:AlternateContent xmlns:mc="http://schemas.openxmlformats.org/markup-compatibility/2006">
-    <mc:Choice xmlns:p14="http://schemas.microsoft.com/office/powerpoint/2010/main" Requires="p14">
+  <mc:AlternateContent xmlns:mc="http://schemas.openxmlformats.org/markup-compatibility/2006" xmlns:p14="http://schemas.microsoft.com/office/powerpoint/2010/main">
+    <mc:Choice Requires="p14">
       <p:transition>
         <p14:reveal/>
       </p:transition>
     </mc:Choice>
-    <mc:Fallback>
+    <mc:Fallback xmlns="">
       <p:transition>
         <p:fade/>
       </p:transition>
@@ -30316,7 +30394,7 @@
 </file>
 
 <file path=ppt/slides/slide25.xml><?xml version="1.0" encoding="utf-8"?>
-<p:sld xmlns:a="http://schemas.openxmlformats.org/drawingml/2006/main" xmlns:r="http://schemas.openxmlformats.org/officeDocument/2006/relationships" xmlns:p="http://schemas.openxmlformats.org/presentationml/2006/main" show="0">
+<p:sld xmlns:a="http://schemas.openxmlformats.org/drawingml/2006/main" xmlns:r="http://schemas.openxmlformats.org/officeDocument/2006/relationships" xmlns:p="http://schemas.openxmlformats.org/presentationml/2006/main">
   <p:cSld>
     <p:spTree>
       <p:nvGrpSpPr>
@@ -30490,29 +30568,59 @@
               <a:rPr lang="hr-HR" sz="2000" dirty="0" smtClean="0">
                 <a:ea typeface="WenQuanYi Micro Hei" charset="0"/>
               </a:rPr>
-              <a:t>POL. POREDAK / TIPOVI POL. POREDAKA / OBLICI DRŽAVNE </a:t>
-            </a:r>
-            <a:r>
-              <a:rPr lang="hr-HR" sz="2000" dirty="0" smtClean="0">
-                <a:ea typeface="WenQuanYi Micro Hei" charset="0"/>
-              </a:rPr>
-              <a:t>VLASTI</a:t>
-            </a:r>
+              <a:t>POL. POREDAK / TIPOVI POL. POREDAKA / OBLICI DRŽAVNE VLASTI</a:t>
+            </a:r>
+          </a:p>
+          <a:p>
+            <a:pPr>
+              <a:spcBef>
+                <a:spcPts val="1800"/>
+              </a:spcBef>
+            </a:pPr>
+            <a:r>
+              <a:rPr lang="hr-HR" sz="2400" b="1" smtClean="0">
+                <a:solidFill>
+                  <a:srgbClr val="FFC000"/>
+                </a:solidFill>
+                <a:effectLst>
+                  <a:outerShdw blurRad="38100" dist="38100" dir="2700000" algn="tl">
+                    <a:srgbClr val="000000">
+                      <a:alpha val="43137"/>
+                    </a:srgbClr>
+                  </a:outerShdw>
+                </a:effectLst>
+              </a:rPr>
+              <a:t>prezentacije na linku:</a:t>
+            </a:r>
+            <a:r>
+              <a:rPr lang="hr-HR" sz="2400" smtClean="0"/>
+              <a:t>	</a:t>
+            </a:r>
+            <a:r>
+              <a:rPr lang="hr-HR" i="1" smtClean="0"/>
+              <a:t>srednja-skola.github.io/politika</a:t>
+            </a:r>
+            <a:endParaRPr lang="hr-HR" i="1" dirty="0" smtClean="0"/>
           </a:p>
         </p:txBody>
       </p:sp>
     </p:spTree>
+    <p:extLst>
+      <p:ext uri="{BB962C8B-B14F-4D97-AF65-F5344CB8AC3E}">
+        <p14:creationId xmlns:p14="http://schemas.microsoft.com/office/powerpoint/2010/main" val="3381265253"/>
+      </p:ext>
+    </p:extLst>
   </p:cSld>
   <p:clrMapOvr>
     <a:masterClrMapping/>
   </p:clrMapOvr>
-  <mc:AlternateContent xmlns:mc="http://schemas.openxmlformats.org/markup-compatibility/2006">
-    <mc:Choice xmlns:p14="http://schemas.microsoft.com/office/powerpoint/2010/main" Requires="p14">
+  <mc:AlternateContent xmlns:mc="http://schemas.openxmlformats.org/markup-compatibility/2006" xmlns:p14="http://schemas.microsoft.com/office/powerpoint/2010/main">
+    <mc:Choice Requires="p14">
       <p:transition>
         <p14:reveal/>
       </p:transition>
     </mc:Choice>
-    <mc:Fallback>
+    <mc:Fallback xmlns="">
       <p:transition>
         <p:fade/>
       </p:transition>
@@ -31116,6 +31224,67 @@
                       </p:childTnLst>
                     </p:cTn>
                   </p:par>
+                  <p:par>
+                    <p:cTn id="49" fill="hold">
+                      <p:stCondLst>
+                        <p:cond delay="indefinite"/>
+                      </p:stCondLst>
+                      <p:childTnLst>
+                        <p:par>
+                          <p:cTn id="50" fill="hold">
+                            <p:stCondLst>
+                              <p:cond delay="0"/>
+                            </p:stCondLst>
+                            <p:childTnLst>
+                              <p:par>
+                                <p:cTn id="51" presetID="10" presetClass="entr" presetSubtype="0" fill="hold" grpId="0" nodeType="clickEffect">
+                                  <p:stCondLst>
+                                    <p:cond delay="0"/>
+                                  </p:stCondLst>
+                                  <p:childTnLst>
+                                    <p:set>
+                                      <p:cBhvr>
+                                        <p:cTn id="52" dur="1" fill="hold">
+                                          <p:stCondLst>
+                                            <p:cond delay="0"/>
+                                          </p:stCondLst>
+                                        </p:cTn>
+                                        <p:tgtEl>
+                                          <p:spTgt spid="3">
+                                            <p:txEl>
+                                              <p:pRg st="11" end="11"/>
+                                            </p:txEl>
+                                          </p:spTgt>
+                                        </p:tgtEl>
+                                        <p:attrNameLst>
+                                          <p:attrName>style.visibility</p:attrName>
+                                        </p:attrNameLst>
+                                      </p:cBhvr>
+                                      <p:to>
+                                        <p:strVal val="visible"/>
+                                      </p:to>
+                                    </p:set>
+                                    <p:animEffect transition="in" filter="fade">
+                                      <p:cBhvr>
+                                        <p:cTn id="53" dur="250"/>
+                                        <p:tgtEl>
+                                          <p:spTgt spid="3">
+                                            <p:txEl>
+                                              <p:pRg st="11" end="11"/>
+                                            </p:txEl>
+                                          </p:spTgt>
+                                        </p:tgtEl>
+                                      </p:cBhvr>
+                                    </p:animEffect>
+                                  </p:childTnLst>
+                                </p:cTn>
+                              </p:par>
+                            </p:childTnLst>
+                          </p:cTn>
+                        </p:par>
+                      </p:childTnLst>
+                    </p:cTn>
+                  </p:par>
                 </p:childTnLst>
               </p:cTn>
               <p:prevCondLst>
@@ -31138,7 +31307,7 @@
       </p:par>
     </p:tnLst>
     <p:bldLst>
-      <p:bldP spid="3" grpId="0" uiExpand="1" build="p"/>
+      <p:bldP spid="3" grpId="0" build="p"/>
     </p:bldLst>
   </p:timing>
 </p:sld>
@@ -31952,17 +32121,22 @@
         </p:txBody>
       </p:sp>
     </p:spTree>
+    <p:extLst>
+      <p:ext uri="{BB962C8B-B14F-4D97-AF65-F5344CB8AC3E}">
+        <p14:creationId xmlns:p14="http://schemas.microsoft.com/office/powerpoint/2010/main" val="3640180527"/>
+      </p:ext>
+    </p:extLst>
   </p:cSld>
   <p:clrMapOvr>
     <a:masterClrMapping/>
   </p:clrMapOvr>
-  <mc:AlternateContent xmlns:mc="http://schemas.openxmlformats.org/markup-compatibility/2006">
-    <mc:Choice xmlns:p14="http://schemas.microsoft.com/office/powerpoint/2010/main" Requires="p14">
+  <mc:AlternateContent xmlns:mc="http://schemas.openxmlformats.org/markup-compatibility/2006" xmlns:p14="http://schemas.microsoft.com/office/powerpoint/2010/main">
+    <mc:Choice Requires="p14">
       <p:transition>
         <p14:reveal/>
       </p:transition>
     </mc:Choice>
-    <mc:Fallback>
+    <mc:Fallback xmlns="">
       <p:transition>
         <p:fade/>
       </p:transition>
@@ -32383,7 +32557,7 @@
       </p:par>
     </p:tnLst>
     <p:bldLst>
-      <p:bldP spid="24578" grpId="0" uiExpand="1" build="allAtOnce"/>
+      <p:bldP spid="24578" grpId="0" build="allAtOnce"/>
     </p:bldLst>
   </p:timing>
 </p:sld>
@@ -32687,7 +32861,7 @@
         <p:spPr bwMode="auto">
           <a:xfrm>
             <a:off x="2500313" y="858838"/>
-            <a:ext cx="6643687" cy="1200329"/>
+            <a:ext cx="6643687" cy="1122808"/>
           </a:xfrm>
           <a:prstGeom prst="rect">
             <a:avLst/>
@@ -32799,12 +32973,82 @@
                 <a:latin typeface="Calibri" pitchFamily="34" charset="0"/>
                 <a:cs typeface="Calibri" pitchFamily="34" charset="0"/>
               </a:rPr>
-              <a:t>Kr. na Hiosu, ali je svoj procvat doživjela u 5.</a:t>
-            </a:r>
-            <a:r>
-              <a:rPr lang="hr-HR" sz="2400" dirty="0">
+              <a:t>Kr. na Hiosu, ali je svoj procvat doživjela u </a:t>
+            </a:r>
+            <a:r>
+              <a:rPr lang="vi-VN" sz="2400" b="1" dirty="0">
                 <a:solidFill>
-                  <a:srgbClr val="FFFFFF"/>
+                  <a:srgbClr val="FFC000"/>
+                </a:solidFill>
+                <a:latin typeface="Calibri" pitchFamily="34" charset="0"/>
+                <a:cs typeface="Calibri" pitchFamily="34" charset="0"/>
+              </a:rPr>
+              <a:t>5.</a:t>
+            </a:r>
+            <a:r>
+              <a:rPr lang="hr-HR" sz="2400" b="1" dirty="0">
+                <a:solidFill>
+                  <a:srgbClr val="FFC000"/>
+                </a:solidFill>
+                <a:latin typeface="Calibri" pitchFamily="34" charset="0"/>
+                <a:cs typeface="Calibri" pitchFamily="34" charset="0"/>
+              </a:rPr>
+              <a:t> </a:t>
+            </a:r>
+            <a:r>
+              <a:rPr lang="vi-VN" sz="2400" b="1" dirty="0">
+                <a:solidFill>
+                  <a:srgbClr val="FFC000"/>
+                </a:solidFill>
+                <a:latin typeface="Calibri" pitchFamily="34" charset="0"/>
+                <a:cs typeface="Calibri" pitchFamily="34" charset="0"/>
+              </a:rPr>
+              <a:t>st.</a:t>
+            </a:r>
+            <a:r>
+              <a:rPr lang="hr-HR" sz="2400" b="1" dirty="0">
+                <a:solidFill>
+                  <a:srgbClr val="FFC000"/>
+                </a:solidFill>
+                <a:latin typeface="Calibri" pitchFamily="34" charset="0"/>
+                <a:cs typeface="Calibri" pitchFamily="34" charset="0"/>
+              </a:rPr>
+              <a:t> </a:t>
+            </a:r>
+            <a:r>
+              <a:rPr lang="vi-VN" sz="2400" b="1" dirty="0">
+                <a:solidFill>
+                  <a:srgbClr val="FFC000"/>
+                </a:solidFill>
+                <a:latin typeface="Calibri" pitchFamily="34" charset="0"/>
+                <a:cs typeface="Calibri" pitchFamily="34" charset="0"/>
+              </a:rPr>
+              <a:t>pr.</a:t>
+            </a:r>
+            <a:r>
+              <a:rPr lang="hr-HR" sz="2400" b="1" dirty="0">
+                <a:solidFill>
+                  <a:srgbClr val="FFC000"/>
+                </a:solidFill>
+                <a:latin typeface="Calibri" pitchFamily="34" charset="0"/>
+                <a:cs typeface="Calibri" pitchFamily="34" charset="0"/>
+              </a:rPr>
+              <a:t> </a:t>
+            </a:r>
+            <a:r>
+              <a:rPr lang="vi-VN" sz="2400" b="1" dirty="0">
+                <a:solidFill>
+                  <a:srgbClr val="FFC000"/>
+                </a:solidFill>
+                <a:latin typeface="Calibri" pitchFamily="34" charset="0"/>
+                <a:cs typeface="Calibri" pitchFamily="34" charset="0"/>
+              </a:rPr>
+              <a:t>Kr. u Ateni</a:t>
+            </a:r>
+            <a:r>
+              <a:rPr lang="vi-VN" sz="2400" dirty="0">
+                <a:solidFill>
+                  <a:srgbClr val="FFC000"/>
                 </a:solidFill>
                 <a:latin typeface="Calibri" pitchFamily="34" charset="0"/>
                 <a:cs typeface="Calibri" pitchFamily="34" charset="0"/>
@@ -32819,17 +33063,17 @@
                 <a:latin typeface="Calibri" pitchFamily="34" charset="0"/>
                 <a:cs typeface="Calibri" pitchFamily="34" charset="0"/>
               </a:rPr>
-              <a:t>st.</a:t>
-            </a:r>
-            <a:r>
-              <a:rPr lang="hr-HR" sz="2400" dirty="0">
+              <a:t>za vrijeme </a:t>
+            </a:r>
+            <a:r>
+              <a:rPr lang="vi-VN" sz="2400" b="1" dirty="0">
                 <a:solidFill>
-                  <a:srgbClr val="FFFFFF"/>
+                  <a:srgbClr val="FFC000"/>
                 </a:solidFill>
                 <a:latin typeface="Calibri" pitchFamily="34" charset="0"/>
                 <a:cs typeface="Calibri" pitchFamily="34" charset="0"/>
               </a:rPr>
-              <a:t> </a:t>
+              <a:t>Perikla</a:t>
             </a:r>
             <a:r>
               <a:rPr lang="vi-VN" sz="2400" dirty="0">
@@ -32839,27 +33083,7 @@
                 <a:latin typeface="Calibri" pitchFamily="34" charset="0"/>
                 <a:cs typeface="Calibri" pitchFamily="34" charset="0"/>
               </a:rPr>
-              <a:t>pr.</a:t>
-            </a:r>
-            <a:r>
-              <a:rPr lang="hr-HR" sz="2400" dirty="0">
-                <a:solidFill>
-                  <a:srgbClr val="FFFFFF"/>
-                </a:solidFill>
-                <a:latin typeface="Calibri" pitchFamily="34" charset="0"/>
-                <a:cs typeface="Calibri" pitchFamily="34" charset="0"/>
-              </a:rPr>
-              <a:t> </a:t>
-            </a:r>
-            <a:r>
-              <a:rPr lang="vi-VN" sz="2400" dirty="0">
-                <a:solidFill>
-                  <a:srgbClr val="FFFFFF"/>
-                </a:solidFill>
-                <a:latin typeface="Calibri" pitchFamily="34" charset="0"/>
-                <a:cs typeface="Calibri" pitchFamily="34" charset="0"/>
-              </a:rPr>
-              <a:t>Kr. u Ateni za vrijeme Perikla, atenskog vojskovođe </a:t>
+              <a:t>, atenskog vojskovođe </a:t>
             </a:r>
           </a:p>
         </p:txBody>
@@ -33151,17 +33375,22 @@
         </p:txBody>
       </p:sp>
     </p:spTree>
+    <p:extLst>
+      <p:ext uri="{BB962C8B-B14F-4D97-AF65-F5344CB8AC3E}">
+        <p14:creationId xmlns:p14="http://schemas.microsoft.com/office/powerpoint/2010/main" val="2188792411"/>
+      </p:ext>
+    </p:extLst>
   </p:cSld>
   <p:clrMapOvr>
     <a:masterClrMapping/>
   </p:clrMapOvr>
-  <mc:AlternateContent xmlns:mc="http://schemas.openxmlformats.org/markup-compatibility/2006">
-    <mc:Choice xmlns:p14="http://schemas.microsoft.com/office/powerpoint/2010/main" Requires="p14">
+  <mc:AlternateContent xmlns:mc="http://schemas.openxmlformats.org/markup-compatibility/2006" xmlns:p14="http://schemas.microsoft.com/office/powerpoint/2010/main">
+    <mc:Choice Requires="p14">
       <p:transition>
         <p14:reveal/>
       </p:transition>
     </mc:Choice>
-    <mc:Fallback>
+    <mc:Fallback xmlns="">
       <p:transition>
         <p:fade/>
       </p:transition>
@@ -34004,17 +34233,22 @@
         </p:txBody>
       </p:sp>
     </p:spTree>
+    <p:extLst>
+      <p:ext uri="{BB962C8B-B14F-4D97-AF65-F5344CB8AC3E}">
+        <p14:creationId xmlns:p14="http://schemas.microsoft.com/office/powerpoint/2010/main" val="2910720911"/>
+      </p:ext>
+    </p:extLst>
   </p:cSld>
   <p:clrMapOvr>
     <a:masterClrMapping/>
   </p:clrMapOvr>
-  <mc:AlternateContent xmlns:mc="http://schemas.openxmlformats.org/markup-compatibility/2006">
-    <mc:Choice xmlns:p14="http://schemas.microsoft.com/office/powerpoint/2010/main" Requires="p14">
+  <mc:AlternateContent xmlns:mc="http://schemas.openxmlformats.org/markup-compatibility/2006" xmlns:p14="http://schemas.microsoft.com/office/powerpoint/2010/main">
+    <mc:Choice Requires="p14">
       <p:transition>
         <p14:reveal/>
       </p:transition>
     </mc:Choice>
-    <mc:Fallback>
+    <mc:Fallback xmlns="">
       <p:transition>
         <p:fade/>
       </p:transition>
@@ -34711,8 +34945,8 @@
         </p:blipFill>
         <p:spPr>
           <a:xfrm>
-            <a:off x="5786438" y="3857628"/>
-            <a:ext cx="3170237" cy="2606675"/>
+            <a:off x="5652120" y="3880236"/>
+            <a:ext cx="3304555" cy="2717116"/>
           </a:xfrm>
           <a:prstGeom prst="rect">
             <a:avLst/>
@@ -34739,8 +34973,8 @@
         </p:nvSpPr>
         <p:spPr bwMode="auto">
           <a:xfrm>
-            <a:off x="71406" y="4108450"/>
-            <a:ext cx="5715000" cy="2215991"/>
+            <a:off x="71406" y="3789040"/>
+            <a:ext cx="5580714" cy="2785378"/>
           </a:xfrm>
           <a:prstGeom prst="rect">
             <a:avLst/>
@@ -34754,14 +34988,17 @@
           </a:ln>
         </p:spPr>
         <p:txBody>
-          <a:bodyPr>
+          <a:bodyPr wrap="square">
             <a:spAutoFit/>
           </a:bodyPr>
           <a:lstStyle/>
           <a:p>
             <a:pPr marL="457200" indent="-457200" hangingPunct="0">
+              <a:lnSpc>
+                <a:spcPts val="3500"/>
+              </a:lnSpc>
               <a:spcBef>
-                <a:spcPts val="1200"/>
+                <a:spcPts val="1800"/>
               </a:spcBef>
               <a:buClr>
                 <a:schemeClr val="tx1"/>
@@ -34792,7 +35029,7 @@
               <a:t>U širem značenju riječi aristokracija misli se na </a:t>
             </a:r>
             <a:r>
-              <a:rPr lang="hr-HR" sz="2300" i="1" dirty="0">
+              <a:rPr lang="hr-HR" sz="2300" b="1" i="1" dirty="0">
                 <a:solidFill>
                   <a:srgbClr val="FFC000"/>
                 </a:solidFill>
@@ -34809,7 +35046,7 @@
               <a:t>, na obitelj i nasljednike već dokazanih vlastodržaca, te na </a:t>
             </a:r>
             <a:r>
-              <a:rPr lang="hr-HR" sz="2300" i="1" dirty="0">
+              <a:rPr lang="hr-HR" sz="2300" b="1" i="1" dirty="0">
                 <a:solidFill>
                   <a:srgbClr val="FFC000"/>
                 </a:solidFill>
@@ -34947,17 +35184,22 @@
         </p:txBody>
       </p:sp>
     </p:spTree>
+    <p:extLst>
+      <p:ext uri="{BB962C8B-B14F-4D97-AF65-F5344CB8AC3E}">
+        <p14:creationId xmlns:p14="http://schemas.microsoft.com/office/powerpoint/2010/main" val="1255350384"/>
+      </p:ext>
+    </p:extLst>
   </p:cSld>
   <p:clrMapOvr>
     <a:masterClrMapping/>
   </p:clrMapOvr>
-  <mc:AlternateContent xmlns:mc="http://schemas.openxmlformats.org/markup-compatibility/2006">
-    <mc:Choice xmlns:p14="http://schemas.microsoft.com/office/powerpoint/2010/main" Requires="p14">
+  <mc:AlternateContent xmlns:mc="http://schemas.openxmlformats.org/markup-compatibility/2006" xmlns:p14="http://schemas.microsoft.com/office/powerpoint/2010/main">
+    <mc:Choice Requires="p14">
       <p:transition>
         <p14:reveal/>
       </p:transition>
     </mc:Choice>
-    <mc:Fallback>
+    <mc:Fallback xmlns="">
       <p:transition>
         <p:fade/>
       </p:transition>
@@ -35320,6 +35562,9 @@
           <a:lstStyle/>
           <a:p>
             <a:pPr marL="457200" indent="-457200" hangingPunct="0">
+              <a:lnSpc>
+                <a:spcPct val="100000"/>
+              </a:lnSpc>
               <a:spcBef>
                 <a:spcPts val="1800"/>
               </a:spcBef>
@@ -35382,21 +35627,6 @@
               <a:t> </a:t>
             </a:r>
             <a:r>
-              <a:rPr lang="hr-HR" sz="2400" dirty="0" smtClean="0">
-                <a:effectLst>
-                  <a:outerShdw blurRad="38100" dist="38100" dir="2700000" algn="tl">
-                    <a:srgbClr val="000000">
-                      <a:alpha val="43137"/>
-                    </a:srgbClr>
-                  </a:outerShdw>
-                </a:effectLst>
-                <a:latin typeface="Calibri" pitchFamily="34" charset="0"/>
-                <a:ea typeface="WenQuanYi Micro Hei" charset="0"/>
-                <a:cs typeface="Calibri" pitchFamily="34" charset="0"/>
-              </a:rPr>
-              <a:t>–</a:t>
-            </a:r>
-            <a:r>
               <a:rPr lang="hr-HR" sz="2200" i="1" dirty="0" smtClean="0">
                 <a:latin typeface="Calibri" pitchFamily="34" charset="0"/>
                 <a:ea typeface="WenQuanYi Micro Hei" charset="0"/>
@@ -35487,6 +35717,9 @@
           </a:p>
           <a:p>
             <a:pPr marL="900000" indent="-288000" hangingPunct="0">
+              <a:lnSpc>
+                <a:spcPct val="100000"/>
+              </a:lnSpc>
               <a:spcBef>
                 <a:spcPts val="1800"/>
               </a:spcBef>
@@ -35518,7 +35751,7 @@
                 <a:ea typeface="WenQuanYi Micro Hei" charset="0"/>
                 <a:cs typeface="Calibri" pitchFamily="34" charset="0"/>
               </a:rPr>
-              <a:t>“bolest demokracije” </a:t>
+              <a:t>„bolest demokracije” </a:t>
             </a:r>
             <a:r>
               <a:rPr lang="hr-HR" sz="2400" dirty="0" smtClean="0">
@@ -35531,6 +35764,9 @@
           </a:p>
           <a:p>
             <a:pPr marL="900000" indent="-288000" hangingPunct="0">
+              <a:lnSpc>
+                <a:spcPct val="100000"/>
+              </a:lnSpc>
               <a:spcBef>
                 <a:spcPts val="600"/>
               </a:spcBef>
@@ -35562,7 +35798,7 @@
                 <a:ea typeface="WenQuanYi Micro Hei" charset="0"/>
                 <a:cs typeface="Calibri" pitchFamily="34" charset="0"/>
               </a:rPr>
-              <a:t>“despotska samovlast” </a:t>
+              <a:t>„despotska samovlast” </a:t>
             </a:r>
             <a:r>
               <a:rPr lang="hr-HR" sz="2400" dirty="0" smtClean="0">
@@ -35575,6 +35811,9 @@
           </a:p>
           <a:p>
             <a:pPr marL="360000" indent="-360000" hangingPunct="0">
+              <a:lnSpc>
+                <a:spcPct val="100000"/>
+              </a:lnSpc>
               <a:spcBef>
                 <a:spcPts val="1800"/>
               </a:spcBef>
@@ -35731,6 +35970,9 @@
           </a:p>
           <a:p>
             <a:pPr marL="360000" indent="-360000" hangingPunct="0">
+              <a:lnSpc>
+                <a:spcPct val="100000"/>
+              </a:lnSpc>
               <a:spcBef>
                 <a:spcPts val="1800"/>
               </a:spcBef>
@@ -35796,6 +36038,9 @@
           </a:p>
           <a:p>
             <a:pPr marL="360000" indent="-360000" hangingPunct="0">
+              <a:lnSpc>
+                <a:spcPct val="100000"/>
+              </a:lnSpc>
               <a:spcBef>
                 <a:spcPts val="1800"/>
               </a:spcBef>
@@ -35922,42 +36167,17 @@
                 <a:ea typeface="+mn-ea"/>
                 <a:cs typeface="Calibri" pitchFamily="34" charset="0"/>
               </a:rPr>
-              <a:t>su sredstva pomoću kojih je tiranija jedino moguća</a:t>
+              <a:t>su sredstva pomoću kojih je tiranija jedino </a:t>
+            </a:r>
+            <a:r>
+              <a:rPr lang="vi-VN" sz="2400" dirty="0" smtClean="0">
+                <a:latin typeface="Calibri" pitchFamily="34" charset="0"/>
+                <a:ea typeface="+mn-ea"/>
+                <a:cs typeface="Calibri" pitchFamily="34" charset="0"/>
+              </a:rPr>
+              <a:t>moguća</a:t>
             </a:r>
             <a:endParaRPr lang="vi-VN" sz="2400" dirty="0">
-              <a:latin typeface="Calibri" pitchFamily="34" charset="0"/>
-              <a:ea typeface="WenQuanYi Micro Hei" charset="0"/>
-              <a:cs typeface="Calibri" pitchFamily="34" charset="0"/>
-            </a:endParaRPr>
-          </a:p>
-          <a:p>
-            <a:pPr marL="457200" indent="-457200" hangingPunct="0">
-              <a:spcBef>
-                <a:spcPts val="1200"/>
-              </a:spcBef>
-              <a:buClr>
-                <a:schemeClr val="tx1"/>
-              </a:buClr>
-              <a:buSzPct val="100000"/>
-              <a:buFont typeface="Arial" pitchFamily="34" charset="0"/>
-              <a:buChar char="–"/>
-              <a:tabLst>
-                <a:tab pos="723900" algn="l"/>
-                <a:tab pos="1447800" algn="l"/>
-                <a:tab pos="2171700" algn="l"/>
-                <a:tab pos="2895600" algn="l"/>
-                <a:tab pos="3619500" algn="l"/>
-                <a:tab pos="4343400" algn="l"/>
-                <a:tab pos="5067300" algn="l"/>
-                <a:tab pos="5791200" algn="l"/>
-                <a:tab pos="6515100" algn="l"/>
-                <a:tab pos="7239000" algn="l"/>
-                <a:tab pos="7962900" algn="l"/>
-                <a:tab pos="8686800" algn="l"/>
-              </a:tabLst>
-              <a:defRPr/>
-            </a:pPr>
-            <a:endParaRPr lang="hr-HR" sz="2400" i="1" dirty="0">
               <a:latin typeface="Calibri" pitchFamily="34" charset="0"/>
               <a:ea typeface="WenQuanYi Micro Hei" charset="0"/>
               <a:cs typeface="Calibri" pitchFamily="34" charset="0"/>
@@ -36071,17 +36291,22 @@
         </p:txBody>
       </p:sp>
     </p:spTree>
+    <p:extLst>
+      <p:ext uri="{BB962C8B-B14F-4D97-AF65-F5344CB8AC3E}">
+        <p14:creationId xmlns:p14="http://schemas.microsoft.com/office/powerpoint/2010/main" val="3724636597"/>
+      </p:ext>
+    </p:extLst>
   </p:cSld>
   <p:clrMapOvr>
     <a:masterClrMapping/>
   </p:clrMapOvr>
-  <mc:AlternateContent xmlns:mc="http://schemas.openxmlformats.org/markup-compatibility/2006">
-    <mc:Choice xmlns:p14="http://schemas.microsoft.com/office/powerpoint/2010/main" Requires="p14">
+  <mc:AlternateContent xmlns:mc="http://schemas.openxmlformats.org/markup-compatibility/2006" xmlns:p14="http://schemas.microsoft.com/office/powerpoint/2010/main">
+    <mc:Choice Requires="p14">
       <p:transition>
         <p14:reveal/>
       </p:transition>
     </mc:Choice>
-    <mc:Fallback>
+    <mc:Fallback xmlns="">
       <p:transition>
         <p:fade/>
       </p:transition>
@@ -36441,7 +36666,7 @@
       </p:par>
     </p:tnLst>
     <p:bldLst>
-      <p:bldP spid="24578" grpId="0" uiExpand="1" build="allAtOnce"/>
+      <p:bldP spid="24578" grpId="0" build="allAtOnce"/>
     </p:bldLst>
   </p:timing>
 </p:sld>
@@ -36568,6 +36793,9 @@
           <a:lstStyle/>
           <a:p>
             <a:pPr marL="457200" indent="-457200" hangingPunct="0">
+              <a:lnSpc>
+                <a:spcPct val="100000"/>
+              </a:lnSpc>
               <a:spcBef>
                 <a:spcPts val="0"/>
               </a:spcBef>
@@ -36883,6 +37111,9 @@
           </a:p>
           <a:p>
             <a:pPr marL="1008000" indent="-457200" hangingPunct="0">
+              <a:lnSpc>
+                <a:spcPct val="100000"/>
+              </a:lnSpc>
               <a:spcBef>
                 <a:spcPts val="1200"/>
               </a:spcBef>
@@ -36937,6 +37168,9 @@
           </a:p>
           <a:p>
             <a:pPr marL="1008000" indent="-457200" hangingPunct="0">
+              <a:lnSpc>
+                <a:spcPct val="100000"/>
+              </a:lnSpc>
               <a:spcBef>
                 <a:spcPts val="1200"/>
               </a:spcBef>
@@ -36991,6 +37225,9 @@
           </a:p>
           <a:p>
             <a:pPr marL="1008000" indent="-457200" hangingPunct="0">
+              <a:lnSpc>
+                <a:spcPct val="100000"/>
+              </a:lnSpc>
               <a:spcBef>
                 <a:spcPts val="1200"/>
               </a:spcBef>
@@ -37093,6 +37330,9 @@
           </a:p>
           <a:p>
             <a:pPr marL="1008000" indent="-457200" hangingPunct="0">
+              <a:lnSpc>
+                <a:spcPct val="100000"/>
+              </a:lnSpc>
               <a:spcBef>
                 <a:spcPts val="1200"/>
               </a:spcBef>
@@ -37147,6 +37387,9 @@
           </a:p>
           <a:p>
             <a:pPr marL="1008000" indent="-457200" hangingPunct="0">
+              <a:lnSpc>
+                <a:spcPct val="100000"/>
+              </a:lnSpc>
               <a:spcBef>
                 <a:spcPts val="1200"/>
               </a:spcBef>
@@ -37205,28 +37448,28 @@
               <a:t>, </a:t>
             </a:r>
             <a:r>
+              <a:rPr lang="hr-HR" sz="2400" i="1" dirty="0" err="1">
+                <a:latin typeface="Calibri" pitchFamily="34" charset="0"/>
+                <a:ea typeface="+mn-ea"/>
+                <a:cs typeface="Calibri" pitchFamily="34" charset="0"/>
+              </a:rPr>
+              <a:t>Pinocet</a:t>
+            </a:r>
+            <a:r>
+              <a:rPr lang="hr-HR" sz="2400" i="1" dirty="0" smtClean="0">
+                <a:latin typeface="Calibri" pitchFamily="34" charset="0"/>
+                <a:ea typeface="+mn-ea"/>
+                <a:cs typeface="Calibri" pitchFamily="34" charset="0"/>
+              </a:rPr>
+              <a:t>, Franco,  Staljin, Tito</a:t>
+            </a:r>
+            <a:r>
               <a:rPr lang="hr-HR" sz="2400" i="1" dirty="0">
                 <a:latin typeface="Calibri" pitchFamily="34" charset="0"/>
                 <a:ea typeface="+mn-ea"/>
                 <a:cs typeface="Calibri" pitchFamily="34" charset="0"/>
               </a:rPr>
-              <a:t>Franco, </a:t>
-            </a:r>
-            <a:r>
-              <a:rPr lang="hr-HR" sz="2400" i="1" dirty="0" err="1">
-                <a:latin typeface="Calibri" pitchFamily="34" charset="0"/>
-                <a:ea typeface="+mn-ea"/>
-                <a:cs typeface="Calibri" pitchFamily="34" charset="0"/>
-              </a:rPr>
-              <a:t>Pinocet</a:t>
-            </a:r>
-            <a:r>
-              <a:rPr lang="hr-HR" sz="2400" i="1" dirty="0">
-                <a:latin typeface="Calibri" pitchFamily="34" charset="0"/>
-                <a:ea typeface="+mn-ea"/>
-                <a:cs typeface="Calibri" pitchFamily="34" charset="0"/>
-              </a:rPr>
-              <a:t>, Tito, </a:t>
+              <a:t>, </a:t>
             </a:r>
             <a:r>
               <a:rPr lang="hr-HR" sz="2400" i="1" dirty="0" err="1">
@@ -37288,17 +37531,22 @@
         </p:spPr>
       </p:pic>
     </p:spTree>
+    <p:extLst>
+      <p:ext uri="{BB962C8B-B14F-4D97-AF65-F5344CB8AC3E}">
+        <p14:creationId xmlns:p14="http://schemas.microsoft.com/office/powerpoint/2010/main" val="649348913"/>
+      </p:ext>
+    </p:extLst>
   </p:cSld>
   <p:clrMapOvr>
     <a:masterClrMapping/>
   </p:clrMapOvr>
-  <mc:AlternateContent xmlns:mc="http://schemas.openxmlformats.org/markup-compatibility/2006">
-    <mc:Choice xmlns:p14="http://schemas.microsoft.com/office/powerpoint/2010/main" Requires="p14">
+  <mc:AlternateContent xmlns:mc="http://schemas.openxmlformats.org/markup-compatibility/2006" xmlns:p14="http://schemas.microsoft.com/office/powerpoint/2010/main">
+    <mc:Choice Requires="p14">
       <p:transition>
         <p14:reveal/>
       </p:transition>
     </mc:Choice>
-    <mc:Fallback>
+    <mc:Fallback xmlns="">
       <p:transition>
         <p:fade/>
       </p:transition>
@@ -37658,7 +37906,7 @@
       </p:par>
     </p:tnLst>
     <p:bldLst>
-      <p:bldP spid="24578" grpId="0" uiExpand="1" build="allAtOnce"/>
+      <p:bldP spid="24578" grpId="0" build="allAtOnce"/>
     </p:bldLst>
   </p:timing>
 </p:sld>
@@ -37711,6 +37959,9 @@
           <a:lstStyle/>
           <a:p>
             <a:pPr marL="457200" indent="-457200" hangingPunct="0">
+              <a:lnSpc>
+                <a:spcPct val="100000"/>
+              </a:lnSpc>
               <a:spcBef>
                 <a:spcPts val="0"/>
               </a:spcBef>
@@ -37737,6 +37988,24 @@
               <a:defRPr/>
             </a:pPr>
             <a:r>
+              <a:rPr lang="hr-HR" sz="3600" b="1" dirty="0">
+                <a:solidFill>
+                  <a:srgbClr val="FFC000"/>
+                </a:solidFill>
+                <a:effectLst>
+                  <a:outerShdw blurRad="38100" dist="38100" dir="2700000" algn="tl">
+                    <a:srgbClr val="000000">
+                      <a:alpha val="43137"/>
+                    </a:srgbClr>
+                  </a:outerShdw>
+                </a:effectLst>
+                <a:latin typeface="Calibri" pitchFamily="34" charset="0"/>
+                <a:ea typeface="WenQuanYi Micro Hei" charset="0"/>
+                <a:cs typeface="Calibri" pitchFamily="34" charset="0"/>
+              </a:rPr>
+              <a:t>TOTALITARIZAM</a:t>
+            </a:r>
+            <a:r>
               <a:rPr lang="hr-HR" sz="3200" b="1" dirty="0">
                 <a:solidFill>
                   <a:srgbClr val="FFC000"/>
@@ -37752,24 +38021,6 @@
                 <a:ea typeface="WenQuanYi Micro Hei" charset="0"/>
                 <a:cs typeface="Calibri" pitchFamily="34" charset="0"/>
               </a:rPr>
-              <a:t>TOTALITARIZAM</a:t>
-            </a:r>
-            <a:r>
-              <a:rPr lang="hr-HR" sz="2800" b="1" dirty="0">
-                <a:solidFill>
-                  <a:srgbClr val="FFC000"/>
-                </a:solidFill>
-                <a:effectLst>
-                  <a:outerShdw blurRad="38100" dist="38100" dir="2700000" algn="tl">
-                    <a:srgbClr val="000000">
-                      <a:alpha val="43137"/>
-                    </a:srgbClr>
-                  </a:outerShdw>
-                </a:effectLst>
-                <a:latin typeface="Calibri" pitchFamily="34" charset="0"/>
-                <a:ea typeface="WenQuanYi Micro Hei" charset="0"/>
-                <a:cs typeface="Calibri" pitchFamily="34" charset="0"/>
-              </a:rPr>
               <a:t> </a:t>
             </a:r>
             <a:r>
@@ -37934,8 +38185,11 @@
           </a:p>
           <a:p>
             <a:pPr marL="457200" indent="-457200" hangingPunct="0">
+              <a:lnSpc>
+                <a:spcPct val="100000"/>
+              </a:lnSpc>
               <a:spcBef>
-                <a:spcPts val="1200"/>
+                <a:spcPts val="2400"/>
               </a:spcBef>
               <a:buClr>
                 <a:schemeClr val="tx1"/>
@@ -37980,8 +38234,11 @@
           </a:p>
           <a:p>
             <a:pPr marL="1200150" lvl="1" indent="-457200" hangingPunct="0">
+              <a:lnSpc>
+                <a:spcPct val="100000"/>
+              </a:lnSpc>
               <a:spcBef>
-                <a:spcPts val="0"/>
+                <a:spcPts val="600"/>
               </a:spcBef>
               <a:buClr>
                 <a:schemeClr val="tx1"/>
@@ -38026,8 +38283,11 @@
           </a:p>
           <a:p>
             <a:pPr marL="1200150" lvl="1" indent="-457200" hangingPunct="0">
+              <a:lnSpc>
+                <a:spcPct val="100000"/>
+              </a:lnSpc>
               <a:spcBef>
-                <a:spcPts val="0"/>
+                <a:spcPts val="600"/>
               </a:spcBef>
               <a:buClr>
                 <a:schemeClr val="tx1"/>
@@ -38080,8 +38340,11 @@
           </a:p>
           <a:p>
             <a:pPr marL="1200150" lvl="1" indent="-457200" hangingPunct="0">
+              <a:lnSpc>
+                <a:spcPct val="100000"/>
+              </a:lnSpc>
               <a:spcBef>
-                <a:spcPts val="0"/>
+                <a:spcPts val="600"/>
               </a:spcBef>
               <a:buClr>
                 <a:schemeClr val="tx1"/>
@@ -38126,8 +38389,11 @@
           </a:p>
           <a:p>
             <a:pPr marL="1200150" lvl="1" indent="-457200" hangingPunct="0">
+              <a:lnSpc>
+                <a:spcPct val="100000"/>
+              </a:lnSpc>
               <a:spcBef>
-                <a:spcPts val="0"/>
+                <a:spcPts val="600"/>
               </a:spcBef>
               <a:buClr>
                 <a:schemeClr val="tx1"/>
@@ -38226,8 +38492,8 @@
         </p:nvSpPr>
         <p:spPr>
           <a:xfrm>
-            <a:off x="71438" y="5098333"/>
-            <a:ext cx="9001156" cy="830997"/>
+            <a:off x="71438" y="5553000"/>
+            <a:ext cx="9001156" cy="1015663"/>
           </a:xfrm>
           <a:prstGeom prst="rect">
             <a:avLst/>
@@ -38240,6 +38506,9 @@
           <a:lstStyle/>
           <a:p>
             <a:pPr marL="457200" lvl="0" indent="-457200" hangingPunct="0">
+              <a:lnSpc>
+                <a:spcPts val="3600"/>
+              </a:lnSpc>
               <a:spcBef>
                 <a:spcPts val="1200"/>
               </a:spcBef>
@@ -38274,7 +38543,73 @@
                 <a:ea typeface="WenQuanYi Micro Hei" charset="0"/>
                 <a:cs typeface="Calibri" pitchFamily="34" charset="0"/>
               </a:rPr>
-              <a:t>primjeri:  nacizam (Njemačka), fašizam (Italija) i komunizam (SSSR, Crveni </a:t>
+              <a:t>primjeri:  </a:t>
+            </a:r>
+            <a:r>
+              <a:rPr lang="hr-HR" sz="2400" i="1" u="sng" dirty="0" smtClean="0">
+                <a:solidFill>
+                  <a:prstClr val="white"/>
+                </a:solidFill>
+                <a:latin typeface="Calibri" pitchFamily="34" charset="0"/>
+                <a:ea typeface="WenQuanYi Micro Hei" charset="0"/>
+                <a:cs typeface="Calibri" pitchFamily="34" charset="0"/>
+              </a:rPr>
+              <a:t>nacizam</a:t>
+            </a:r>
+            <a:r>
+              <a:rPr lang="hr-HR" sz="2400" i="1" dirty="0" smtClean="0">
+                <a:solidFill>
+                  <a:prstClr val="white"/>
+                </a:solidFill>
+                <a:latin typeface="Calibri" pitchFamily="34" charset="0"/>
+                <a:ea typeface="WenQuanYi Micro Hei" charset="0"/>
+                <a:cs typeface="Calibri" pitchFamily="34" charset="0"/>
+              </a:rPr>
+              <a:t> (Njemačka), </a:t>
+            </a:r>
+            <a:r>
+              <a:rPr lang="hr-HR" sz="2400" i="1" u="sng" dirty="0" smtClean="0">
+                <a:solidFill>
+                  <a:prstClr val="white"/>
+                </a:solidFill>
+                <a:latin typeface="Calibri" pitchFamily="34" charset="0"/>
+                <a:ea typeface="WenQuanYi Micro Hei" charset="0"/>
+                <a:cs typeface="Calibri" pitchFamily="34" charset="0"/>
+              </a:rPr>
+              <a:t>fašizam</a:t>
+            </a:r>
+            <a:r>
+              <a:rPr lang="hr-HR" sz="2400" i="1" dirty="0" smtClean="0">
+                <a:solidFill>
+                  <a:prstClr val="white"/>
+                </a:solidFill>
+                <a:latin typeface="Calibri" pitchFamily="34" charset="0"/>
+                <a:ea typeface="WenQuanYi Micro Hei" charset="0"/>
+                <a:cs typeface="Calibri" pitchFamily="34" charset="0"/>
+              </a:rPr>
+              <a:t> (Italija) i </a:t>
+            </a:r>
+            <a:r>
+              <a:rPr lang="hr-HR" sz="2400" i="1" u="sng" dirty="0" smtClean="0">
+                <a:solidFill>
+                  <a:prstClr val="white"/>
+                </a:solidFill>
+                <a:latin typeface="Calibri" pitchFamily="34" charset="0"/>
+                <a:ea typeface="WenQuanYi Micro Hei" charset="0"/>
+                <a:cs typeface="Calibri" pitchFamily="34" charset="0"/>
+              </a:rPr>
+              <a:t>komunizam</a:t>
+            </a:r>
+            <a:r>
+              <a:rPr lang="hr-HR" sz="2400" i="1" dirty="0" smtClean="0">
+                <a:solidFill>
+                  <a:prstClr val="white"/>
+                </a:solidFill>
+                <a:latin typeface="Calibri" pitchFamily="34" charset="0"/>
+                <a:ea typeface="WenQuanYi Micro Hei" charset="0"/>
+                <a:cs typeface="Calibri" pitchFamily="34" charset="0"/>
+              </a:rPr>
+              <a:t> (SSSR, Crveni </a:t>
             </a:r>
             <a:r>
               <a:rPr lang="hr-HR" sz="2400" i="1" dirty="0" err="1" smtClean="0">
@@ -38302,17 +38637,22 @@
         </p:txBody>
       </p:sp>
     </p:spTree>
+    <p:extLst>
+      <p:ext uri="{BB962C8B-B14F-4D97-AF65-F5344CB8AC3E}">
+        <p14:creationId xmlns:p14="http://schemas.microsoft.com/office/powerpoint/2010/main" val="1991726324"/>
+      </p:ext>
+    </p:extLst>
   </p:cSld>
   <p:clrMapOvr>
     <a:masterClrMapping/>
   </p:clrMapOvr>
-  <mc:AlternateContent xmlns:mc="http://schemas.openxmlformats.org/markup-compatibility/2006">
-    <mc:Choice xmlns:p14="http://schemas.microsoft.com/office/powerpoint/2010/main" Requires="p14">
+  <mc:AlternateContent xmlns:mc="http://schemas.openxmlformats.org/markup-compatibility/2006" xmlns:p14="http://schemas.microsoft.com/office/powerpoint/2010/main">
+    <mc:Choice Requires="p14">
       <p:transition>
         <p14:reveal/>
       </p:transition>
     </mc:Choice>
-    <mc:Fallback>
+    <mc:Fallback xmlns="">
       <p:transition>
         <p:fade/>
       </p:transition>

</xml_diff>